<commit_message>
Update GLT Involuntary Off-boarding AAR 2022-04-06.pptx
</commit_message>
<xml_diff>
--- a/classes/AAR/complete/GLT Involuntary Off-boarding AAR 2022-04-06.pptx
+++ b/classes/AAR/complete/GLT Involuntary Off-boarding AAR 2022-04-06.pptx
@@ -5,10 +5,10 @@
     <p:sldMasterId id="2147483666" r:id="rId4"/>
   </p:sldMasterIdLst>
   <p:notesMasterIdLst>
-    <p:notesMasterId r:id="rId15"/>
+    <p:notesMasterId r:id="rId18"/>
   </p:notesMasterIdLst>
   <p:handoutMasterIdLst>
-    <p:handoutMasterId r:id="rId16"/>
+    <p:handoutMasterId r:id="rId19"/>
   </p:handoutMasterIdLst>
   <p:sldIdLst>
     <p:sldId id="256" r:id="rId5"/>
@@ -16,11 +16,14 @@
     <p:sldId id="271" r:id="rId7"/>
     <p:sldId id="258" r:id="rId8"/>
     <p:sldId id="261" r:id="rId9"/>
-    <p:sldId id="262" r:id="rId10"/>
-    <p:sldId id="265" r:id="rId11"/>
-    <p:sldId id="266" r:id="rId12"/>
-    <p:sldId id="274" r:id="rId13"/>
-    <p:sldId id="267" r:id="rId14"/>
+    <p:sldId id="275" r:id="rId10"/>
+    <p:sldId id="276" r:id="rId11"/>
+    <p:sldId id="262" r:id="rId12"/>
+    <p:sldId id="265" r:id="rId13"/>
+    <p:sldId id="277" r:id="rId14"/>
+    <p:sldId id="266" r:id="rId15"/>
+    <p:sldId id="274" r:id="rId16"/>
+    <p:sldId id="267" r:id="rId17"/>
   </p:sldIdLst>
   <p:sldSz cx="9144000" cy="6858000" type="screen4x3"/>
   <p:notesSz cx="6858000" cy="9296400"/>
@@ -287,14 +290,14 @@
           <a:effectLst/>
           <a:extLst>
             <a:ext uri="{909E8E84-426E-40dd-AFC4-6F175D3DCCD1}">
-              <a14:hiddenFill xmlns="" xmlns:a14="http://schemas.microsoft.com/office/drawing/2010/main">
+              <a14:hiddenFill xmlns:a14="http://schemas.microsoft.com/office/drawing/2010/main" xmlns="">
                 <a:solidFill>
                   <a:schemeClr val="accent1"/>
                 </a:solidFill>
               </a14:hiddenFill>
             </a:ext>
             <a:ext uri="{91240B29-F687-4f45-9708-019B960494DF}">
-              <a14:hiddenLine xmlns="" xmlns:a14="http://schemas.microsoft.com/office/drawing/2010/main" w="9525">
+              <a14:hiddenLine xmlns:a14="http://schemas.microsoft.com/office/drawing/2010/main" xmlns="" w="9525">
                 <a:solidFill>
                   <a:schemeClr val="tx1"/>
                 </a:solidFill>
@@ -304,7 +307,7 @@
               </a14:hiddenLine>
             </a:ext>
             <a:ext uri="{AF507438-7753-43e0-B8FC-AC1667EBCBE1}">
-              <a14:hiddenEffects xmlns="" xmlns:a14="http://schemas.microsoft.com/office/drawing/2010/main">
+              <a14:hiddenEffects xmlns:a14="http://schemas.microsoft.com/office/drawing/2010/main" xmlns="">
                 <a:effectLst>
                   <a:outerShdw dist="35921" dir="2700000" algn="ctr" rotWithShape="0">
                     <a:schemeClr val="bg2"/>
@@ -362,14 +365,14 @@
           <a:effectLst/>
           <a:extLst>
             <a:ext uri="{909E8E84-426E-40dd-AFC4-6F175D3DCCD1}">
-              <a14:hiddenFill xmlns="" xmlns:a14="http://schemas.microsoft.com/office/drawing/2010/main">
+              <a14:hiddenFill xmlns:a14="http://schemas.microsoft.com/office/drawing/2010/main" xmlns="">
                 <a:solidFill>
                   <a:schemeClr val="accent1"/>
                 </a:solidFill>
               </a14:hiddenFill>
             </a:ext>
             <a:ext uri="{91240B29-F687-4f45-9708-019B960494DF}">
-              <a14:hiddenLine xmlns="" xmlns:a14="http://schemas.microsoft.com/office/drawing/2010/main" w="9525">
+              <a14:hiddenLine xmlns:a14="http://schemas.microsoft.com/office/drawing/2010/main" xmlns="" w="9525">
                 <a:solidFill>
                   <a:schemeClr val="tx1"/>
                 </a:solidFill>
@@ -379,7 +382,7 @@
               </a14:hiddenLine>
             </a:ext>
             <a:ext uri="{AF507438-7753-43e0-B8FC-AC1667EBCBE1}">
-              <a14:hiddenEffects xmlns="" xmlns:a14="http://schemas.microsoft.com/office/drawing/2010/main">
+              <a14:hiddenEffects xmlns:a14="http://schemas.microsoft.com/office/drawing/2010/main" xmlns="">
                 <a:effectLst>
                   <a:outerShdw dist="35921" dir="2700000" algn="ctr" rotWithShape="0">
                     <a:schemeClr val="bg2"/>
@@ -437,14 +440,14 @@
           <a:effectLst/>
           <a:extLst>
             <a:ext uri="{909E8E84-426E-40dd-AFC4-6F175D3DCCD1}">
-              <a14:hiddenFill xmlns="" xmlns:a14="http://schemas.microsoft.com/office/drawing/2010/main">
+              <a14:hiddenFill xmlns:a14="http://schemas.microsoft.com/office/drawing/2010/main" xmlns="">
                 <a:solidFill>
                   <a:schemeClr val="accent1"/>
                 </a:solidFill>
               </a14:hiddenFill>
             </a:ext>
             <a:ext uri="{91240B29-F687-4f45-9708-019B960494DF}">
-              <a14:hiddenLine xmlns="" xmlns:a14="http://schemas.microsoft.com/office/drawing/2010/main" w="9525">
+              <a14:hiddenLine xmlns:a14="http://schemas.microsoft.com/office/drawing/2010/main" xmlns="" w="9525">
                 <a:solidFill>
                   <a:schemeClr val="tx1"/>
                 </a:solidFill>
@@ -454,7 +457,7 @@
               </a14:hiddenLine>
             </a:ext>
             <a:ext uri="{AF507438-7753-43e0-B8FC-AC1667EBCBE1}">
-              <a14:hiddenEffects xmlns="" xmlns:a14="http://schemas.microsoft.com/office/drawing/2010/main">
+              <a14:hiddenEffects xmlns:a14="http://schemas.microsoft.com/office/drawing/2010/main" xmlns="">
                 <a:effectLst>
                   <a:outerShdw dist="35921" dir="2700000" algn="ctr" rotWithShape="0">
                     <a:schemeClr val="bg2"/>
@@ -512,14 +515,14 @@
           <a:effectLst/>
           <a:extLst>
             <a:ext uri="{909E8E84-426E-40dd-AFC4-6F175D3DCCD1}">
-              <a14:hiddenFill xmlns="" xmlns:a14="http://schemas.microsoft.com/office/drawing/2010/main">
+              <a14:hiddenFill xmlns:a14="http://schemas.microsoft.com/office/drawing/2010/main" xmlns="">
                 <a:solidFill>
                   <a:schemeClr val="accent1"/>
                 </a:solidFill>
               </a14:hiddenFill>
             </a:ext>
             <a:ext uri="{91240B29-F687-4f45-9708-019B960494DF}">
-              <a14:hiddenLine xmlns="" xmlns:a14="http://schemas.microsoft.com/office/drawing/2010/main" w="9525">
+              <a14:hiddenLine xmlns:a14="http://schemas.microsoft.com/office/drawing/2010/main" xmlns="" w="9525">
                 <a:solidFill>
                   <a:schemeClr val="tx1"/>
                 </a:solidFill>
@@ -529,7 +532,7 @@
               </a14:hiddenLine>
             </a:ext>
             <a:ext uri="{AF507438-7753-43e0-B8FC-AC1667EBCBE1}">
-              <a14:hiddenEffects xmlns="" xmlns:a14="http://schemas.microsoft.com/office/drawing/2010/main">
+              <a14:hiddenEffects xmlns:a14="http://schemas.microsoft.com/office/drawing/2010/main" xmlns="">
                 <a:effectLst>
                   <a:outerShdw dist="35921" dir="2700000" algn="ctr" rotWithShape="0">
                     <a:schemeClr val="bg2"/>
@@ -628,14 +631,14 @@
           <a:effectLst/>
           <a:extLst>
             <a:ext uri="{909E8E84-426E-40dd-AFC4-6F175D3DCCD1}">
-              <a14:hiddenFill xmlns="" xmlns:a14="http://schemas.microsoft.com/office/drawing/2010/main">
+              <a14:hiddenFill xmlns:a14="http://schemas.microsoft.com/office/drawing/2010/main" xmlns="">
                 <a:solidFill>
                   <a:schemeClr val="accent1"/>
                 </a:solidFill>
               </a14:hiddenFill>
             </a:ext>
             <a:ext uri="{91240B29-F687-4f45-9708-019B960494DF}">
-              <a14:hiddenLine xmlns="" xmlns:a14="http://schemas.microsoft.com/office/drawing/2010/main" w="9525">
+              <a14:hiddenLine xmlns:a14="http://schemas.microsoft.com/office/drawing/2010/main" xmlns="" w="9525">
                 <a:solidFill>
                   <a:schemeClr val="tx1"/>
                 </a:solidFill>
@@ -645,7 +648,7 @@
               </a14:hiddenLine>
             </a:ext>
             <a:ext uri="{AF507438-7753-43e0-B8FC-AC1667EBCBE1}">
-              <a14:hiddenEffects xmlns="" xmlns:a14="http://schemas.microsoft.com/office/drawing/2010/main">
+              <a14:hiddenEffects xmlns:a14="http://schemas.microsoft.com/office/drawing/2010/main" xmlns="">
                 <a:effectLst>
                   <a:outerShdw dist="35921" dir="2700000" algn="ctr" rotWithShape="0">
                     <a:schemeClr val="bg2"/>
@@ -703,14 +706,14 @@
           <a:effectLst/>
           <a:extLst>
             <a:ext uri="{909E8E84-426E-40dd-AFC4-6F175D3DCCD1}">
-              <a14:hiddenFill xmlns="" xmlns:a14="http://schemas.microsoft.com/office/drawing/2010/main">
+              <a14:hiddenFill xmlns:a14="http://schemas.microsoft.com/office/drawing/2010/main" xmlns="">
                 <a:solidFill>
                   <a:schemeClr val="accent1"/>
                 </a:solidFill>
               </a14:hiddenFill>
             </a:ext>
             <a:ext uri="{91240B29-F687-4f45-9708-019B960494DF}">
-              <a14:hiddenLine xmlns="" xmlns:a14="http://schemas.microsoft.com/office/drawing/2010/main" w="9525">
+              <a14:hiddenLine xmlns:a14="http://schemas.microsoft.com/office/drawing/2010/main" xmlns="" w="9525">
                 <a:solidFill>
                   <a:schemeClr val="tx1"/>
                 </a:solidFill>
@@ -720,7 +723,7 @@
               </a14:hiddenLine>
             </a:ext>
             <a:ext uri="{AF507438-7753-43e0-B8FC-AC1667EBCBE1}">
-              <a14:hiddenEffects xmlns="" xmlns:a14="http://schemas.microsoft.com/office/drawing/2010/main">
+              <a14:hiddenEffects xmlns:a14="http://schemas.microsoft.com/office/drawing/2010/main" xmlns="">
                 <a:effectLst>
                   <a:outerShdw dist="35921" dir="2700000" algn="ctr" rotWithShape="0">
                     <a:schemeClr val="bg2"/>
@@ -783,7 +786,7 @@
           <a:effectLst/>
           <a:extLst>
             <a:ext uri="{AF507438-7753-43e0-B8FC-AC1667EBCBE1}">
-              <a14:hiddenEffects xmlns="" xmlns:a14="http://schemas.microsoft.com/office/drawing/2010/main">
+              <a14:hiddenEffects xmlns:a14="http://schemas.microsoft.com/office/drawing/2010/main" xmlns="">
                 <a:effectLst>
                   <a:outerShdw dist="35921" dir="2700000" algn="ctr" rotWithShape="0">
                     <a:srgbClr val="808080"/>
@@ -792,7 +795,7 @@
               </a14:hiddenEffects>
             </a:ext>
             <a:ext uri="{53640926-AAD7-44d8-BBD7-CCE9431645EC}">
-              <a14:shadowObscured xmlns="" xmlns:a14="http://schemas.microsoft.com/office/drawing/2010/main" val="1"/>
+              <a14:shadowObscured xmlns:a14="http://schemas.microsoft.com/office/drawing/2010/main" xmlns="" val="1"/>
             </a:ext>
           </a:extLst>
         </p:spPr>
@@ -822,14 +825,14 @@
           <a:effectLst/>
           <a:extLst>
             <a:ext uri="{909E8E84-426E-40dd-AFC4-6F175D3DCCD1}">
-              <a14:hiddenFill xmlns="" xmlns:a14="http://schemas.microsoft.com/office/drawing/2010/main">
+              <a14:hiddenFill xmlns:a14="http://schemas.microsoft.com/office/drawing/2010/main" xmlns="">
                 <a:solidFill>
                   <a:schemeClr val="accent1"/>
                 </a:solidFill>
               </a14:hiddenFill>
             </a:ext>
             <a:ext uri="{91240B29-F687-4f45-9708-019B960494DF}">
-              <a14:hiddenLine xmlns="" xmlns:a14="http://schemas.microsoft.com/office/drawing/2010/main" w="9525">
+              <a14:hiddenLine xmlns:a14="http://schemas.microsoft.com/office/drawing/2010/main" xmlns="" w="9525">
                 <a:solidFill>
                   <a:schemeClr val="tx1"/>
                 </a:solidFill>
@@ -839,7 +842,7 @@
               </a14:hiddenLine>
             </a:ext>
             <a:ext uri="{AF507438-7753-43e0-B8FC-AC1667EBCBE1}">
-              <a14:hiddenEffects xmlns="" xmlns:a14="http://schemas.microsoft.com/office/drawing/2010/main">
+              <a14:hiddenEffects xmlns:a14="http://schemas.microsoft.com/office/drawing/2010/main" xmlns="">
                 <a:effectLst>
                   <a:outerShdw dist="35921" dir="2700000" algn="ctr" rotWithShape="0">
                     <a:schemeClr val="bg2"/>
@@ -918,14 +921,14 @@
           <a:effectLst/>
           <a:extLst>
             <a:ext uri="{909E8E84-426E-40dd-AFC4-6F175D3DCCD1}">
-              <a14:hiddenFill xmlns="" xmlns:a14="http://schemas.microsoft.com/office/drawing/2010/main">
+              <a14:hiddenFill xmlns:a14="http://schemas.microsoft.com/office/drawing/2010/main" xmlns="">
                 <a:solidFill>
                   <a:schemeClr val="accent1"/>
                 </a:solidFill>
               </a14:hiddenFill>
             </a:ext>
             <a:ext uri="{91240B29-F687-4f45-9708-019B960494DF}">
-              <a14:hiddenLine xmlns="" xmlns:a14="http://schemas.microsoft.com/office/drawing/2010/main" w="9525">
+              <a14:hiddenLine xmlns:a14="http://schemas.microsoft.com/office/drawing/2010/main" xmlns="" w="9525">
                 <a:solidFill>
                   <a:schemeClr val="tx1"/>
                 </a:solidFill>
@@ -935,7 +938,7 @@
               </a14:hiddenLine>
             </a:ext>
             <a:ext uri="{AF507438-7753-43e0-B8FC-AC1667EBCBE1}">
-              <a14:hiddenEffects xmlns="" xmlns:a14="http://schemas.microsoft.com/office/drawing/2010/main">
+              <a14:hiddenEffects xmlns:a14="http://schemas.microsoft.com/office/drawing/2010/main" xmlns="">
                 <a:effectLst>
                   <a:outerShdw dist="35921" dir="2700000" algn="ctr" rotWithShape="0">
                     <a:schemeClr val="bg2"/>
@@ -993,14 +996,14 @@
           <a:effectLst/>
           <a:extLst>
             <a:ext uri="{909E8E84-426E-40dd-AFC4-6F175D3DCCD1}">
-              <a14:hiddenFill xmlns="" xmlns:a14="http://schemas.microsoft.com/office/drawing/2010/main">
+              <a14:hiddenFill xmlns:a14="http://schemas.microsoft.com/office/drawing/2010/main" xmlns="">
                 <a:solidFill>
                   <a:schemeClr val="accent1"/>
                 </a:solidFill>
               </a14:hiddenFill>
             </a:ext>
             <a:ext uri="{91240B29-F687-4f45-9708-019B960494DF}">
-              <a14:hiddenLine xmlns="" xmlns:a14="http://schemas.microsoft.com/office/drawing/2010/main" w="9525">
+              <a14:hiddenLine xmlns:a14="http://schemas.microsoft.com/office/drawing/2010/main" xmlns="" w="9525">
                 <a:solidFill>
                   <a:schemeClr val="tx1"/>
                 </a:solidFill>
@@ -1010,7 +1013,7 @@
               </a14:hiddenLine>
             </a:ext>
             <a:ext uri="{AF507438-7753-43e0-B8FC-AC1667EBCBE1}">
-              <a14:hiddenEffects xmlns="" xmlns:a14="http://schemas.microsoft.com/office/drawing/2010/main">
+              <a14:hiddenEffects xmlns:a14="http://schemas.microsoft.com/office/drawing/2010/main" xmlns="">
                 <a:effectLst>
                   <a:outerShdw dist="35921" dir="2700000" algn="ctr" rotWithShape="0">
                     <a:schemeClr val="bg2"/>
@@ -1269,6 +1272,363 @@
 </p:notes>
 </file>
 
+<file path=ppt/notesSlides/notesSlide10.xml><?xml version="1.0" encoding="utf-8"?>
+<p:notes xmlns:a="http://schemas.openxmlformats.org/drawingml/2006/main" xmlns:r="http://schemas.openxmlformats.org/officeDocument/2006/relationships" xmlns:p="http://schemas.openxmlformats.org/presentationml/2006/main">
+  <p:cSld>
+    <p:spTree>
+      <p:nvGrpSpPr>
+        <p:cNvPr id="1" name=""/>
+        <p:cNvGrpSpPr/>
+        <p:nvPr/>
+      </p:nvGrpSpPr>
+      <p:grpSpPr>
+        <a:xfrm>
+          <a:off x="0" y="0"/>
+          <a:ext cx="0" cy="0"/>
+          <a:chOff x="0" y="0"/>
+          <a:chExt cx="0" cy="0"/>
+        </a:xfrm>
+      </p:grpSpPr>
+      <p:sp>
+        <p:nvSpPr>
+          <p:cNvPr id="2" name="Slide Image Placeholder 1"/>
+          <p:cNvSpPr>
+            <a:spLocks noGrp="1" noRot="1" noChangeAspect="1"/>
+          </p:cNvSpPr>
+          <p:nvPr>
+            <p:ph type="sldImg"/>
+          </p:nvPr>
+        </p:nvSpPr>
+        <p:spPr/>
+      </p:sp>
+      <p:sp>
+        <p:nvSpPr>
+          <p:cNvPr id="3" name="Notes Placeholder 2"/>
+          <p:cNvSpPr>
+            <a:spLocks noGrp="1"/>
+          </p:cNvSpPr>
+          <p:nvPr>
+            <p:ph type="body" idx="1"/>
+          </p:nvPr>
+        </p:nvSpPr>
+        <p:spPr/>
+        <p:txBody>
+          <a:bodyPr/>
+          <a:lstStyle/>
+          <a:p>
+            <a:r>
+              <a:rPr lang="en-US" dirty="0"/>
+              <a:t>What didn’t go well, or could have gone better?</a:t>
+            </a:r>
+          </a:p>
+          <a:p>
+            <a:endParaRPr lang="en-US" dirty="0"/>
+          </a:p>
+          <a:p>
+            <a:r>
+              <a:rPr lang="en-US" dirty="0"/>
+              <a:t>If possible, </a:t>
+            </a:r>
+            <a:r>
+              <a:rPr lang="en-US" b="1" dirty="0"/>
+              <a:t>dig to find root causes of potential improvements</a:t>
+            </a:r>
+            <a:r>
+              <a:rPr lang="en-US" dirty="0"/>
+              <a:t>. Suggest steps to address these root causes.</a:t>
+            </a:r>
+          </a:p>
+          <a:p>
+            <a:r>
+              <a:rPr lang="en-US" dirty="0"/>
+              <a:t>Each improvement should include a suggestion for how to mitigate or alleviate the issue in the future. Sometimes simply being aware of an issue is a good first step in remediation.</a:t>
+            </a:r>
+          </a:p>
+        </p:txBody>
+      </p:sp>
+      <p:sp>
+        <p:nvSpPr>
+          <p:cNvPr id="4" name="Slide Number Placeholder 3"/>
+          <p:cNvSpPr>
+            <a:spLocks noGrp="1"/>
+          </p:cNvSpPr>
+          <p:nvPr>
+            <p:ph type="sldNum" sz="quarter" idx="5"/>
+          </p:nvPr>
+        </p:nvSpPr>
+        <p:spPr/>
+        <p:txBody>
+          <a:bodyPr/>
+          <a:lstStyle/>
+          <a:p>
+            <a:fld id="{55D68406-F15C-4303-97CE-0E3EE59880C4}" type="slidenum">
+              <a:rPr lang="en-US" smtClean="0"/>
+              <a:pPr/>
+              <a:t>10</a:t>
+            </a:fld>
+            <a:endParaRPr lang="en-US" dirty="0"/>
+          </a:p>
+        </p:txBody>
+      </p:sp>
+    </p:spTree>
+    <p:extLst>
+      <p:ext uri="{BB962C8B-B14F-4D97-AF65-F5344CB8AC3E}">
+        <p14:creationId xmlns:p14="http://schemas.microsoft.com/office/powerpoint/2010/main" val="790833849"/>
+      </p:ext>
+    </p:extLst>
+  </p:cSld>
+  <p:clrMapOvr>
+    <a:masterClrMapping/>
+  </p:clrMapOvr>
+</p:notes>
+</file>
+
+<file path=ppt/notesSlides/notesSlide11.xml><?xml version="1.0" encoding="utf-8"?>
+<p:notes xmlns:a="http://schemas.openxmlformats.org/drawingml/2006/main" xmlns:r="http://schemas.openxmlformats.org/officeDocument/2006/relationships" xmlns:p="http://schemas.openxmlformats.org/presentationml/2006/main">
+  <p:cSld>
+    <p:spTree>
+      <p:nvGrpSpPr>
+        <p:cNvPr id="1" name=""/>
+        <p:cNvGrpSpPr/>
+        <p:nvPr/>
+      </p:nvGrpSpPr>
+      <p:grpSpPr>
+        <a:xfrm>
+          <a:off x="0" y="0"/>
+          <a:ext cx="0" cy="0"/>
+          <a:chOff x="0" y="0"/>
+          <a:chExt cx="0" cy="0"/>
+        </a:xfrm>
+      </p:grpSpPr>
+      <p:sp>
+        <p:nvSpPr>
+          <p:cNvPr id="2" name="Slide Image Placeholder 1"/>
+          <p:cNvSpPr>
+            <a:spLocks noGrp="1" noRot="1" noChangeAspect="1"/>
+          </p:cNvSpPr>
+          <p:nvPr>
+            <p:ph type="sldImg"/>
+          </p:nvPr>
+        </p:nvSpPr>
+        <p:spPr/>
+      </p:sp>
+      <p:sp>
+        <p:nvSpPr>
+          <p:cNvPr id="3" name="Notes Placeholder 2"/>
+          <p:cNvSpPr>
+            <a:spLocks noGrp="1"/>
+          </p:cNvSpPr>
+          <p:nvPr>
+            <p:ph type="body" idx="1"/>
+          </p:nvPr>
+        </p:nvSpPr>
+        <p:spPr/>
+        <p:txBody>
+          <a:bodyPr/>
+          <a:lstStyle/>
+          <a:p>
+            <a:r>
+              <a:rPr lang="en-US" dirty="0"/>
+              <a:t>Collect a listing of:</a:t>
+            </a:r>
+          </a:p>
+          <a:p>
+            <a:pPr marL="228600" indent="-228600">
+              <a:buAutoNum type="arabicPeriod"/>
+            </a:pPr>
+            <a:r>
+              <a:rPr lang="en-US" dirty="0"/>
+              <a:t>Items to </a:t>
+            </a:r>
+            <a:r>
+              <a:rPr lang="en-US" b="1" dirty="0"/>
+              <a:t>sustain</a:t>
+            </a:r>
+            <a:r>
+              <a:rPr lang="en-US" b="0" dirty="0"/>
+              <a:t> – things that went well and should be encouraged going forward. Include ideas on how to institutionalize these items if possible.</a:t>
+            </a:r>
+          </a:p>
+          <a:p>
+            <a:pPr marL="228600" indent="-228600">
+              <a:buAutoNum type="arabicPeriod"/>
+            </a:pPr>
+            <a:r>
+              <a:rPr lang="en-US" dirty="0"/>
+              <a:t>Items to </a:t>
+            </a:r>
+            <a:r>
+              <a:rPr lang="en-US" b="1" dirty="0"/>
+              <a:t>improve </a:t>
+            </a:r>
+            <a:r>
+              <a:rPr lang="en-US" b="0" dirty="0"/>
+              <a:t>or </a:t>
+            </a:r>
+            <a:r>
+              <a:rPr lang="en-US" b="1" dirty="0"/>
+              <a:t>avoid</a:t>
+            </a:r>
+            <a:r>
+              <a:rPr lang="en-US" b="0" dirty="0"/>
+              <a:t> – specific issues to watch out for next time, and ways to test for, anticipate, and reduce the impact of these negative events</a:t>
+            </a:r>
+          </a:p>
+          <a:p>
+            <a:pPr marL="228600" indent="-228600">
+              <a:buAutoNum type="arabicPeriod"/>
+            </a:pPr>
+            <a:r>
+              <a:rPr lang="en-US" b="0" dirty="0"/>
+              <a:t>Anything else the group wants to note (praise is OK, blame is not; try to think in terms of the next team to do this)</a:t>
+            </a:r>
+            <a:endParaRPr lang="en-US" dirty="0"/>
+          </a:p>
+        </p:txBody>
+      </p:sp>
+      <p:sp>
+        <p:nvSpPr>
+          <p:cNvPr id="4" name="Slide Number Placeholder 3"/>
+          <p:cNvSpPr>
+            <a:spLocks noGrp="1"/>
+          </p:cNvSpPr>
+          <p:nvPr>
+            <p:ph type="sldNum" sz="quarter" idx="5"/>
+          </p:nvPr>
+        </p:nvSpPr>
+        <p:spPr/>
+        <p:txBody>
+          <a:bodyPr/>
+          <a:lstStyle/>
+          <a:p>
+            <a:fld id="{55D68406-F15C-4303-97CE-0E3EE59880C4}" type="slidenum">
+              <a:rPr lang="en-US" smtClean="0"/>
+              <a:pPr/>
+              <a:t>11</a:t>
+            </a:fld>
+            <a:endParaRPr lang="en-US" dirty="0"/>
+          </a:p>
+        </p:txBody>
+      </p:sp>
+    </p:spTree>
+    <p:extLst>
+      <p:ext uri="{BB962C8B-B14F-4D97-AF65-F5344CB8AC3E}">
+        <p14:creationId xmlns:p14="http://schemas.microsoft.com/office/powerpoint/2010/main" val="1530468823"/>
+      </p:ext>
+    </p:extLst>
+  </p:cSld>
+  <p:clrMapOvr>
+    <a:masterClrMapping/>
+  </p:clrMapOvr>
+</p:notes>
+</file>
+
+<file path=ppt/notesSlides/notesSlide12.xml><?xml version="1.0" encoding="utf-8"?>
+<p:notes xmlns:a="http://schemas.openxmlformats.org/drawingml/2006/main" xmlns:r="http://schemas.openxmlformats.org/officeDocument/2006/relationships" xmlns:p="http://schemas.openxmlformats.org/presentationml/2006/main">
+  <p:cSld>
+    <p:spTree>
+      <p:nvGrpSpPr>
+        <p:cNvPr id="1" name=""/>
+        <p:cNvGrpSpPr/>
+        <p:nvPr/>
+      </p:nvGrpSpPr>
+      <p:grpSpPr>
+        <a:xfrm>
+          <a:off x="0" y="0"/>
+          <a:ext cx="0" cy="0"/>
+          <a:chOff x="0" y="0"/>
+          <a:chExt cx="0" cy="0"/>
+        </a:xfrm>
+      </p:grpSpPr>
+      <p:sp>
+        <p:nvSpPr>
+          <p:cNvPr id="2" name="Slide Image Placeholder 1"/>
+          <p:cNvSpPr>
+            <a:spLocks noGrp="1" noRot="1" noChangeAspect="1"/>
+          </p:cNvSpPr>
+          <p:nvPr>
+            <p:ph type="sldImg"/>
+          </p:nvPr>
+        </p:nvSpPr>
+        <p:spPr/>
+      </p:sp>
+      <p:sp>
+        <p:nvSpPr>
+          <p:cNvPr id="3" name="Notes Placeholder 2"/>
+          <p:cNvSpPr>
+            <a:spLocks noGrp="1"/>
+          </p:cNvSpPr>
+          <p:nvPr>
+            <p:ph type="body" idx="1"/>
+          </p:nvPr>
+        </p:nvSpPr>
+        <p:spPr/>
+        <p:txBody>
+          <a:bodyPr/>
+          <a:lstStyle/>
+          <a:p>
+            <a:r>
+              <a:rPr lang="en-US" dirty="0"/>
+              <a:t>Any additional comments?</a:t>
+            </a:r>
+          </a:p>
+          <a:p>
+            <a:endParaRPr lang="en-US" dirty="0"/>
+          </a:p>
+          <a:p>
+            <a:r>
+              <a:rPr lang="en-US" dirty="0"/>
+              <a:t>Now is also the time to make sure </a:t>
+            </a:r>
+            <a:r>
+              <a:rPr lang="en-US" b="1" dirty="0"/>
+              <a:t>attendance</a:t>
+            </a:r>
+            <a:r>
+              <a:rPr lang="en-US" b="0" dirty="0"/>
+              <a:t> is accurate – collect emails and send out notes afterwards</a:t>
+            </a:r>
+            <a:endParaRPr lang="en-US" dirty="0"/>
+          </a:p>
+        </p:txBody>
+      </p:sp>
+      <p:sp>
+        <p:nvSpPr>
+          <p:cNvPr id="4" name="Slide Number Placeholder 3"/>
+          <p:cNvSpPr>
+            <a:spLocks noGrp="1"/>
+          </p:cNvSpPr>
+          <p:nvPr>
+            <p:ph type="sldNum" sz="quarter" idx="5"/>
+          </p:nvPr>
+        </p:nvSpPr>
+        <p:spPr/>
+        <p:txBody>
+          <a:bodyPr/>
+          <a:lstStyle/>
+          <a:p>
+            <a:fld id="{55D68406-F15C-4303-97CE-0E3EE59880C4}" type="slidenum">
+              <a:rPr lang="en-US" smtClean="0"/>
+              <a:pPr/>
+              <a:t>13</a:t>
+            </a:fld>
+            <a:endParaRPr lang="en-US" dirty="0"/>
+          </a:p>
+        </p:txBody>
+      </p:sp>
+    </p:spTree>
+    <p:extLst>
+      <p:ext uri="{BB962C8B-B14F-4D97-AF65-F5344CB8AC3E}">
+        <p14:creationId xmlns:p14="http://schemas.microsoft.com/office/powerpoint/2010/main" val="3587738676"/>
+      </p:ext>
+    </p:extLst>
+  </p:cSld>
+  <p:clrMapOvr>
+    <a:masterClrMapping/>
+  </p:clrMapOvr>
+</p:notes>
+</file>
+
 <file path=ppt/notesSlides/notesSlide2.xml><?xml version="1.0" encoding="utf-8"?>
 <p:notes xmlns:a="http://schemas.openxmlformats.org/drawingml/2006/main" xmlns:r="http://schemas.openxmlformats.org/officeDocument/2006/relationships" xmlns:p="http://schemas.openxmlformats.org/presentationml/2006/main">
   <p:cSld>
@@ -1716,48 +2076,34 @@
           <a:p>
             <a:r>
               <a:rPr lang="en-US" dirty="0"/>
-              <a:t>What went well?</a:t>
-            </a:r>
-          </a:p>
-          <a:p>
-            <a:r>
-              <a:rPr lang="en-US" dirty="0"/>
-              <a:t>Why?</a:t>
-            </a:r>
-          </a:p>
-          <a:p>
+              <a:t>Ask participants to describe what transpired during the activity </a:t>
+            </a:r>
+            <a:r>
+              <a:rPr lang="en-US" b="1" dirty="0"/>
+              <a:t>from their point of view</a:t>
+            </a:r>
+            <a:r>
+              <a:rPr lang="en-US" b="0" dirty="0"/>
+              <a:t> and </a:t>
+            </a:r>
+            <a:r>
+              <a:rPr lang="en-US" b="1" dirty="0"/>
+              <a:t>in their own words</a:t>
+            </a:r>
+            <a:r>
+              <a:rPr lang="en-US" b="0" dirty="0"/>
+              <a:t>.</a:t>
+            </a:r>
+          </a:p>
+          <a:p>
+            <a:r>
+              <a:rPr lang="en-US" b="0" dirty="0"/>
+              <a:t>Sometimes different participants will have different views of the task and will emphasize different aspects.</a:t>
+            </a:r>
             <a:endParaRPr lang="en-US" dirty="0"/>
           </a:p>
           <a:p>
-            <a:r>
-              <a:rPr lang="en-US" dirty="0"/>
-              <a:t>If possible, </a:t>
-            </a:r>
-            <a:r>
-              <a:rPr lang="en-US" b="1" dirty="0"/>
-              <a:t>dig deeper to find root causes</a:t>
-            </a:r>
-            <a:r>
-              <a:rPr lang="en-US" dirty="0"/>
-              <a:t>.</a:t>
-            </a:r>
-          </a:p>
-          <a:p>
             <a:endParaRPr lang="en-US" dirty="0"/>
-          </a:p>
-          <a:p>
-            <a:r>
-              <a:rPr lang="en-US" dirty="0"/>
-              <a:t>How can we institutionalize or </a:t>
-            </a:r>
-            <a:r>
-              <a:rPr lang="en-US" b="1" dirty="0"/>
-              <a:t>sustain that effort</a:t>
-            </a:r>
-            <a:r>
-              <a:rPr lang="en-US" dirty="0"/>
-              <a:t> going forward?</a:t>
-            </a:r>
           </a:p>
         </p:txBody>
       </p:sp>
@@ -1788,7 +2134,7 @@
     </p:spTree>
     <p:extLst>
       <p:ext uri="{BB962C8B-B14F-4D97-AF65-F5344CB8AC3E}">
-        <p14:creationId xmlns:p14="http://schemas.microsoft.com/office/powerpoint/2010/main" val="2771883430"/>
+        <p14:creationId xmlns:p14="http://schemas.microsoft.com/office/powerpoint/2010/main" val="1404434973"/>
       </p:ext>
     </p:extLst>
   </p:cSld>
@@ -1844,31 +2190,34 @@
           <a:p>
             <a:r>
               <a:rPr lang="en-US" dirty="0"/>
-              <a:t>What didn’t go well, or could have gone better?</a:t>
-            </a:r>
-          </a:p>
-          <a:p>
+              <a:t>Ask participants to describe what transpired during the activity </a:t>
+            </a:r>
+            <a:r>
+              <a:rPr lang="en-US" b="1" dirty="0"/>
+              <a:t>from their point of view</a:t>
+            </a:r>
+            <a:r>
+              <a:rPr lang="en-US" b="0" dirty="0"/>
+              <a:t> and </a:t>
+            </a:r>
+            <a:r>
+              <a:rPr lang="en-US" b="1" dirty="0"/>
+              <a:t>in their own words</a:t>
+            </a:r>
+            <a:r>
+              <a:rPr lang="en-US" b="0" dirty="0"/>
+              <a:t>.</a:t>
+            </a:r>
+          </a:p>
+          <a:p>
+            <a:r>
+              <a:rPr lang="en-US" b="0" dirty="0"/>
+              <a:t>Sometimes different participants will have different views of the task and will emphasize different aspects.</a:t>
+            </a:r>
             <a:endParaRPr lang="en-US" dirty="0"/>
           </a:p>
           <a:p>
-            <a:r>
-              <a:rPr lang="en-US" dirty="0"/>
-              <a:t>If possible, </a:t>
-            </a:r>
-            <a:r>
-              <a:rPr lang="en-US" b="1" dirty="0"/>
-              <a:t>dig to find root causes of potential improvements</a:t>
-            </a:r>
-            <a:r>
-              <a:rPr lang="en-US" dirty="0"/>
-              <a:t>. Suggest steps to address these root causes.</a:t>
-            </a:r>
-          </a:p>
-          <a:p>
-            <a:r>
-              <a:rPr lang="en-US" dirty="0"/>
-              <a:t>Each improvement should include a suggestion for how to mitigate or alleviate the issue in the future. Sometimes simply being aware of an issue is a good first step in remediation.</a:t>
-            </a:r>
+            <a:endParaRPr lang="en-US" dirty="0"/>
           </a:p>
         </p:txBody>
       </p:sp>
@@ -1899,7 +2248,7 @@
     </p:spTree>
     <p:extLst>
       <p:ext uri="{BB962C8B-B14F-4D97-AF65-F5344CB8AC3E}">
-        <p14:creationId xmlns:p14="http://schemas.microsoft.com/office/powerpoint/2010/main" val="276477835"/>
+        <p14:creationId xmlns:p14="http://schemas.microsoft.com/office/powerpoint/2010/main" val="1434385084"/>
       </p:ext>
     </p:extLst>
   </p:cSld>
@@ -1955,60 +2304,48 @@
           <a:p>
             <a:r>
               <a:rPr lang="en-US" dirty="0"/>
-              <a:t>Collect a listing of:</a:t>
-            </a:r>
-          </a:p>
-          <a:p>
-            <a:pPr marL="228600" indent="-228600">
-              <a:buAutoNum type="arabicPeriod"/>
-            </a:pPr>
+              <a:t>What went well?</a:t>
+            </a:r>
+          </a:p>
+          <a:p>
             <a:r>
               <a:rPr lang="en-US" dirty="0"/>
-              <a:t>Items to </a:t>
+              <a:t>Why?</a:t>
+            </a:r>
+          </a:p>
+          <a:p>
+            <a:endParaRPr lang="en-US" dirty="0"/>
+          </a:p>
+          <a:p>
+            <a:r>
+              <a:rPr lang="en-US" dirty="0"/>
+              <a:t>If possible, </a:t>
             </a:r>
             <a:r>
               <a:rPr lang="en-US" b="1" dirty="0"/>
-              <a:t>sustain</a:t>
-            </a:r>
-            <a:r>
-              <a:rPr lang="en-US" b="0" dirty="0"/>
-              <a:t> – things that went well and should be encouraged going forward. Include ideas on how to institutionalize these items if possible.</a:t>
-            </a:r>
-          </a:p>
-          <a:p>
-            <a:pPr marL="228600" indent="-228600">
-              <a:buAutoNum type="arabicPeriod"/>
-            </a:pPr>
+              <a:t>dig deeper to find root causes</a:t>
+            </a:r>
             <a:r>
               <a:rPr lang="en-US" dirty="0"/>
-              <a:t>Items to </a:t>
+              <a:t>.</a:t>
+            </a:r>
+          </a:p>
+          <a:p>
+            <a:endParaRPr lang="en-US" dirty="0"/>
+          </a:p>
+          <a:p>
+            <a:r>
+              <a:rPr lang="en-US" dirty="0"/>
+              <a:t>How can we institutionalize or </a:t>
             </a:r>
             <a:r>
               <a:rPr lang="en-US" b="1" dirty="0"/>
-              <a:t>improve </a:t>
-            </a:r>
-            <a:r>
-              <a:rPr lang="en-US" b="0" dirty="0"/>
-              <a:t>or </a:t>
-            </a:r>
-            <a:r>
-              <a:rPr lang="en-US" b="1" dirty="0"/>
-              <a:t>avoid</a:t>
-            </a:r>
-            <a:r>
-              <a:rPr lang="en-US" b="0" dirty="0"/>
-              <a:t> – specific issues to watch out for next time, and ways to test for, anticipate, and reduce the impact of these negative events</a:t>
-            </a:r>
-          </a:p>
-          <a:p>
-            <a:pPr marL="228600" indent="-228600">
-              <a:buAutoNum type="arabicPeriod"/>
-            </a:pPr>
-            <a:r>
-              <a:rPr lang="en-US" b="0" dirty="0"/>
-              <a:t>Anything else the group wants to note (praise is OK, blame is not; try to think in terms of the next team to do this)</a:t>
-            </a:r>
-            <a:endParaRPr lang="en-US" dirty="0"/>
+              <a:t>sustain that effort</a:t>
+            </a:r>
+            <a:r>
+              <a:rPr lang="en-US" dirty="0"/>
+              <a:t> going forward?</a:t>
+            </a:r>
           </a:p>
         </p:txBody>
       </p:sp>
@@ -2039,7 +2376,7 @@
     </p:spTree>
     <p:extLst>
       <p:ext uri="{BB962C8B-B14F-4D97-AF65-F5344CB8AC3E}">
-        <p14:creationId xmlns:p14="http://schemas.microsoft.com/office/powerpoint/2010/main" val="1530468823"/>
+        <p14:creationId xmlns:p14="http://schemas.microsoft.com/office/powerpoint/2010/main" val="2771883430"/>
       </p:ext>
     </p:extLst>
   </p:cSld>
@@ -2095,7 +2432,7 @@
           <a:p>
             <a:r>
               <a:rPr lang="en-US" dirty="0"/>
-              <a:t>Any additional comments?</a:t>
+              <a:t>What didn’t go well, or could have gone better?</a:t>
             </a:r>
           </a:p>
           <a:p>
@@ -2104,17 +2441,22 @@
           <a:p>
             <a:r>
               <a:rPr lang="en-US" dirty="0"/>
-              <a:t>Now is also the time to make sure </a:t>
+              <a:t>If possible, </a:t>
             </a:r>
             <a:r>
               <a:rPr lang="en-US" b="1" dirty="0"/>
-              <a:t>attendance</a:t>
-            </a:r>
-            <a:r>
-              <a:rPr lang="en-US" b="0" dirty="0"/>
-              <a:t> is accurate – collect emails and send out notes afterwards</a:t>
-            </a:r>
-            <a:endParaRPr lang="en-US" dirty="0"/>
+              <a:t>dig to find root causes of potential improvements</a:t>
+            </a:r>
+            <a:r>
+              <a:rPr lang="en-US" dirty="0"/>
+              <a:t>. Suggest steps to address these root causes.</a:t>
+            </a:r>
+          </a:p>
+          <a:p>
+            <a:r>
+              <a:rPr lang="en-US" dirty="0"/>
+              <a:t>Each improvement should include a suggestion for how to mitigate or alleviate the issue in the future. Sometimes simply being aware of an issue is a good first step in remediation.</a:t>
+            </a:r>
           </a:p>
         </p:txBody>
       </p:sp>
@@ -2136,7 +2478,7 @@
             <a:fld id="{55D68406-F15C-4303-97CE-0E3EE59880C4}" type="slidenum">
               <a:rPr lang="en-US" smtClean="0"/>
               <a:pPr/>
-              <a:t>10</a:t>
+              <a:t>9</a:t>
             </a:fld>
             <a:endParaRPr lang="en-US" dirty="0"/>
           </a:p>
@@ -2145,7 +2487,7 @@
     </p:spTree>
     <p:extLst>
       <p:ext uri="{BB962C8B-B14F-4D97-AF65-F5344CB8AC3E}">
-        <p14:creationId xmlns:p14="http://schemas.microsoft.com/office/powerpoint/2010/main" val="3587738676"/>
+        <p14:creationId xmlns:p14="http://schemas.microsoft.com/office/powerpoint/2010/main" val="276477835"/>
       </p:ext>
     </p:extLst>
   </p:cSld>
@@ -2265,14 +2607,14 @@
           <a:effectLst/>
           <a:extLst>
             <a:ext uri="{909E8E84-426E-40dd-AFC4-6F175D3DCCD1}">
-              <a14:hiddenFill xmlns="" xmlns:a14="http://schemas.microsoft.com/office/drawing/2010/main">
+              <a14:hiddenFill xmlns:a14="http://schemas.microsoft.com/office/drawing/2010/main" xmlns="">
                 <a:solidFill>
                   <a:schemeClr val="accent1"/>
                 </a:solidFill>
               </a14:hiddenFill>
             </a:ext>
             <a:ext uri="{91240B29-F687-4f45-9708-019B960494DF}">
-              <a14:hiddenLine xmlns="" xmlns:a14="http://schemas.microsoft.com/office/drawing/2010/main" w="9525">
+              <a14:hiddenLine xmlns:a14="http://schemas.microsoft.com/office/drawing/2010/main" xmlns="" w="9525">
                 <a:solidFill>
                   <a:schemeClr val="tx1"/>
                 </a:solidFill>
@@ -2282,7 +2624,7 @@
               </a14:hiddenLine>
             </a:ext>
             <a:ext uri="{AF507438-7753-43e0-B8FC-AC1667EBCBE1}">
-              <a14:hiddenEffects xmlns="" xmlns:a14="http://schemas.microsoft.com/office/drawing/2010/main">
+              <a14:hiddenEffects xmlns:a14="http://schemas.microsoft.com/office/drawing/2010/main" xmlns="">
                 <a:effectLst>
                   <a:outerShdw dist="35921" dir="2700000" algn="ctr" rotWithShape="0">
                     <a:schemeClr val="bg2"/>
@@ -2648,7 +2990,7 @@
           <a:effectLst/>
           <a:extLst>
             <a:ext uri="{AF507438-7753-43e0-B8FC-AC1667EBCBE1}">
-              <a14:hiddenEffects xmlns="" xmlns:a14="http://schemas.microsoft.com/office/drawing/2010/main">
+              <a14:hiddenEffects xmlns:a14="http://schemas.microsoft.com/office/drawing/2010/main" xmlns="">
                 <a:effectLst>
                   <a:outerShdw dist="35921" dir="2700000" algn="ctr" rotWithShape="0">
                     <a:schemeClr val="bg2"/>
@@ -2689,14 +3031,14 @@
           <a:effectLst/>
           <a:extLst>
             <a:ext uri="{909E8E84-426E-40dd-AFC4-6F175D3DCCD1}">
-              <a14:hiddenFill xmlns="" xmlns:a14="http://schemas.microsoft.com/office/drawing/2010/main">
+              <a14:hiddenFill xmlns:a14="http://schemas.microsoft.com/office/drawing/2010/main" xmlns="">
                 <a:solidFill>
                   <a:schemeClr val="accent1"/>
                 </a:solidFill>
               </a14:hiddenFill>
             </a:ext>
             <a:ext uri="{91240B29-F687-4f45-9708-019B960494DF}">
-              <a14:hiddenLine xmlns="" xmlns:a14="http://schemas.microsoft.com/office/drawing/2010/main" w="9525">
+              <a14:hiddenLine xmlns:a14="http://schemas.microsoft.com/office/drawing/2010/main" xmlns="" w="9525">
                 <a:solidFill>
                   <a:schemeClr val="tx1"/>
                 </a:solidFill>
@@ -2706,7 +3048,7 @@
               </a14:hiddenLine>
             </a:ext>
             <a:ext uri="{AF507438-7753-43e0-B8FC-AC1667EBCBE1}">
-              <a14:hiddenEffects xmlns="" xmlns:a14="http://schemas.microsoft.com/office/drawing/2010/main">
+              <a14:hiddenEffects xmlns:a14="http://schemas.microsoft.com/office/drawing/2010/main" xmlns="">
                 <a:effectLst>
                   <a:outerShdw dist="35921" dir="2700000" algn="ctr" rotWithShape="0">
                     <a:schemeClr val="bg2"/>
@@ -4335,7 +4677,7 @@
           <a:effectLst/>
           <a:extLst>
             <a:ext uri="{AF507438-7753-43e0-B8FC-AC1667EBCBE1}">
-              <a14:hiddenEffects xmlns="" xmlns:a14="http://schemas.microsoft.com/office/drawing/2010/main">
+              <a14:hiddenEffects xmlns:a14="http://schemas.microsoft.com/office/drawing/2010/main" xmlns="">
                 <a:effectLst>
                   <a:outerShdw dist="35921" dir="2700000" algn="ctr" rotWithShape="0">
                     <a:schemeClr val="bg2"/>
@@ -4378,14 +4720,14 @@
           <a:effectLst/>
           <a:extLst>
             <a:ext uri="{909E8E84-426E-40dd-AFC4-6F175D3DCCD1}">
-              <a14:hiddenFill xmlns="" xmlns:a14="http://schemas.microsoft.com/office/drawing/2010/main">
+              <a14:hiddenFill xmlns:a14="http://schemas.microsoft.com/office/drawing/2010/main" xmlns="">
                 <a:solidFill>
                   <a:schemeClr val="accent1"/>
                 </a:solidFill>
               </a14:hiddenFill>
             </a:ext>
             <a:ext uri="{91240B29-F687-4f45-9708-019B960494DF}">
-              <a14:hiddenLine xmlns="" xmlns:a14="http://schemas.microsoft.com/office/drawing/2010/main" w="9525">
+              <a14:hiddenLine xmlns:a14="http://schemas.microsoft.com/office/drawing/2010/main" xmlns="" w="9525">
                 <a:solidFill>
                   <a:schemeClr val="tx1"/>
                 </a:solidFill>
@@ -4395,7 +4737,7 @@
               </a14:hiddenLine>
             </a:ext>
             <a:ext uri="{AF507438-7753-43e0-B8FC-AC1667EBCBE1}">
-              <a14:hiddenEffects xmlns="" xmlns:a14="http://schemas.microsoft.com/office/drawing/2010/main">
+              <a14:hiddenEffects xmlns:a14="http://schemas.microsoft.com/office/drawing/2010/main" xmlns="">
                 <a:effectLst>
                   <a:outerShdw dist="35921" dir="2700000" algn="ctr" rotWithShape="0">
                     <a:schemeClr val="bg2"/>
@@ -4446,14 +4788,14 @@
           <a:effectLst/>
           <a:extLst>
             <a:ext uri="{909E8E84-426E-40dd-AFC4-6F175D3DCCD1}">
-              <a14:hiddenFill xmlns="" xmlns:a14="http://schemas.microsoft.com/office/drawing/2010/main">
+              <a14:hiddenFill xmlns:a14="http://schemas.microsoft.com/office/drawing/2010/main" xmlns="">
                 <a:solidFill>
                   <a:schemeClr val="accent1"/>
                 </a:solidFill>
               </a14:hiddenFill>
             </a:ext>
             <a:ext uri="{91240B29-F687-4f45-9708-019B960494DF}">
-              <a14:hiddenLine xmlns="" xmlns:a14="http://schemas.microsoft.com/office/drawing/2010/main" w="9525">
+              <a14:hiddenLine xmlns:a14="http://schemas.microsoft.com/office/drawing/2010/main" xmlns="" w="9525">
                 <a:solidFill>
                   <a:schemeClr val="tx1"/>
                 </a:solidFill>
@@ -4463,7 +4805,7 @@
               </a14:hiddenLine>
             </a:ext>
             <a:ext uri="{AF507438-7753-43e0-B8FC-AC1667EBCBE1}">
-              <a14:hiddenEffects xmlns="" xmlns:a14="http://schemas.microsoft.com/office/drawing/2010/main">
+              <a14:hiddenEffects xmlns:a14="http://schemas.microsoft.com/office/drawing/2010/main" xmlns="">
                 <a:effectLst>
                   <a:outerShdw dist="35921" dir="2700000" algn="ctr" rotWithShape="0">
                     <a:schemeClr val="bg2"/>
@@ -4542,14 +4884,14 @@
           <a:effectLst/>
           <a:extLst>
             <a:ext uri="{909E8E84-426E-40dd-AFC4-6F175D3DCCD1}">
-              <a14:hiddenFill xmlns="" xmlns:a14="http://schemas.microsoft.com/office/drawing/2010/main">
+              <a14:hiddenFill xmlns:a14="http://schemas.microsoft.com/office/drawing/2010/main" xmlns="">
                 <a:solidFill>
                   <a:schemeClr val="accent1"/>
                 </a:solidFill>
               </a14:hiddenFill>
             </a:ext>
             <a:ext uri="{91240B29-F687-4f45-9708-019B960494DF}">
-              <a14:hiddenLine xmlns="" xmlns:a14="http://schemas.microsoft.com/office/drawing/2010/main" w="9525">
+              <a14:hiddenLine xmlns:a14="http://schemas.microsoft.com/office/drawing/2010/main" xmlns="" w="9525">
                 <a:solidFill>
                   <a:schemeClr val="tx1"/>
                 </a:solidFill>
@@ -4559,7 +4901,7 @@
               </a14:hiddenLine>
             </a:ext>
             <a:ext uri="{AF507438-7753-43e0-B8FC-AC1667EBCBE1}">
-              <a14:hiddenEffects xmlns="" xmlns:a14="http://schemas.microsoft.com/office/drawing/2010/main">
+              <a14:hiddenEffects xmlns:a14="http://schemas.microsoft.com/office/drawing/2010/main" xmlns="">
                 <a:effectLst>
                   <a:outerShdw dist="35921" dir="2700000" algn="ctr" rotWithShape="0">
                     <a:schemeClr val="bg2"/>
@@ -4624,14 +4966,14 @@
           <a:effectLst/>
           <a:extLst>
             <a:ext uri="{909E8E84-426E-40dd-AFC4-6F175D3DCCD1}">
-              <a14:hiddenFill xmlns="" xmlns:a14="http://schemas.microsoft.com/office/drawing/2010/main">
+              <a14:hiddenFill xmlns:a14="http://schemas.microsoft.com/office/drawing/2010/main" xmlns="">
                 <a:solidFill>
                   <a:schemeClr val="accent1"/>
                 </a:solidFill>
               </a14:hiddenFill>
             </a:ext>
             <a:ext uri="{91240B29-F687-4f45-9708-019B960494DF}">
-              <a14:hiddenLine xmlns="" xmlns:a14="http://schemas.microsoft.com/office/drawing/2010/main" w="9525">
+              <a14:hiddenLine xmlns:a14="http://schemas.microsoft.com/office/drawing/2010/main" xmlns="" w="9525">
                 <a:solidFill>
                   <a:schemeClr val="tx1"/>
                 </a:solidFill>
@@ -4641,7 +4983,7 @@
               </a14:hiddenLine>
             </a:ext>
             <a:ext uri="{AF507438-7753-43e0-B8FC-AC1667EBCBE1}">
-              <a14:hiddenEffects xmlns="" xmlns:a14="http://schemas.microsoft.com/office/drawing/2010/main">
+              <a14:hiddenEffects xmlns:a14="http://schemas.microsoft.com/office/drawing/2010/main" xmlns="">
                 <a:effectLst>
                   <a:outerShdw dist="35921" dir="2700000" algn="ctr" rotWithShape="0">
                     <a:schemeClr val="bg2"/>
@@ -4703,14 +5045,14 @@
           <a:effectLst/>
           <a:extLst>
             <a:ext uri="{909E8E84-426E-40dd-AFC4-6F175D3DCCD1}">
-              <a14:hiddenFill xmlns="" xmlns:a14="http://schemas.microsoft.com/office/drawing/2010/main">
+              <a14:hiddenFill xmlns:a14="http://schemas.microsoft.com/office/drawing/2010/main" xmlns="">
                 <a:solidFill>
                   <a:schemeClr val="accent1"/>
                 </a:solidFill>
               </a14:hiddenFill>
             </a:ext>
             <a:ext uri="{91240B29-F687-4f45-9708-019B960494DF}">
-              <a14:hiddenLine xmlns="" xmlns:a14="http://schemas.microsoft.com/office/drawing/2010/main" w="9525">
+              <a14:hiddenLine xmlns:a14="http://schemas.microsoft.com/office/drawing/2010/main" xmlns="" w="9525">
                 <a:solidFill>
                   <a:schemeClr val="tx1"/>
                 </a:solidFill>
@@ -4720,7 +5062,7 @@
               </a14:hiddenLine>
             </a:ext>
             <a:ext uri="{AF507438-7753-43e0-B8FC-AC1667EBCBE1}">
-              <a14:hiddenEffects xmlns="" xmlns:a14="http://schemas.microsoft.com/office/drawing/2010/main">
+              <a14:hiddenEffects xmlns:a14="http://schemas.microsoft.com/office/drawing/2010/main" xmlns="">
                 <a:effectLst>
                   <a:outerShdw dist="35921" dir="2700000" algn="ctr" rotWithShape="0">
                     <a:schemeClr val="bg2"/>
@@ -4785,14 +5127,14 @@
           <a:effectLst/>
           <a:extLst>
             <a:ext uri="{909E8E84-426E-40dd-AFC4-6F175D3DCCD1}">
-              <a14:hiddenFill xmlns="" xmlns:a14="http://schemas.microsoft.com/office/drawing/2010/main">
+              <a14:hiddenFill xmlns:a14="http://schemas.microsoft.com/office/drawing/2010/main" xmlns="">
                 <a:solidFill>
                   <a:schemeClr val="accent1"/>
                 </a:solidFill>
               </a14:hiddenFill>
             </a:ext>
             <a:ext uri="{91240B29-F687-4f45-9708-019B960494DF}">
-              <a14:hiddenLine xmlns="" xmlns:a14="http://schemas.microsoft.com/office/drawing/2010/main" w="9525">
+              <a14:hiddenLine xmlns:a14="http://schemas.microsoft.com/office/drawing/2010/main" xmlns="" w="9525">
                 <a:solidFill>
                   <a:schemeClr val="tx1"/>
                 </a:solidFill>
@@ -4802,7 +5144,7 @@
               </a14:hiddenLine>
             </a:ext>
             <a:ext uri="{AF507438-7753-43e0-B8FC-AC1667EBCBE1}">
-              <a14:hiddenEffects xmlns="" xmlns:a14="http://schemas.microsoft.com/office/drawing/2010/main">
+              <a14:hiddenEffects xmlns:a14="http://schemas.microsoft.com/office/drawing/2010/main" xmlns="">
                 <a:effectLst>
                   <a:outerShdw dist="35921" dir="2700000" algn="ctr" rotWithShape="0">
                     <a:schemeClr val="bg2"/>
@@ -4861,14 +5203,14 @@
           <a:effectLst/>
           <a:extLst>
             <a:ext uri="{909E8E84-426E-40dd-AFC4-6F175D3DCCD1}">
-              <a14:hiddenFill xmlns="" xmlns:a14="http://schemas.microsoft.com/office/drawing/2010/main">
+              <a14:hiddenFill xmlns:a14="http://schemas.microsoft.com/office/drawing/2010/main" xmlns="">
                 <a:solidFill>
                   <a:schemeClr val="accent1"/>
                 </a:solidFill>
               </a14:hiddenFill>
             </a:ext>
             <a:ext uri="{91240B29-F687-4f45-9708-019B960494DF}">
-              <a14:hiddenLine xmlns="" xmlns:a14="http://schemas.microsoft.com/office/drawing/2010/main" w="9525">
+              <a14:hiddenLine xmlns:a14="http://schemas.microsoft.com/office/drawing/2010/main" xmlns="" w="9525">
                 <a:solidFill>
                   <a:schemeClr val="tx1"/>
                 </a:solidFill>
@@ -4878,7 +5220,7 @@
               </a14:hiddenLine>
             </a:ext>
             <a:ext uri="{AF507438-7753-43e0-B8FC-AC1667EBCBE1}">
-              <a14:hiddenEffects xmlns="" xmlns:a14="http://schemas.microsoft.com/office/drawing/2010/main">
+              <a14:hiddenEffects xmlns:a14="http://schemas.microsoft.com/office/drawing/2010/main" xmlns="">
                 <a:effectLst>
                   <a:outerShdw dist="35921" dir="2700000" algn="ctr" rotWithShape="0">
                     <a:schemeClr val="bg2"/>
@@ -5335,6 +5677,10 @@
             <a:br>
               <a:rPr lang="en-US" dirty="0"/>
             </a:br>
+            <a:r>
+              <a:rPr lang="en-US" dirty="0"/>
+              <a:t/>
+            </a:r>
             <a:br>
               <a:rPr lang="en-US" dirty="0"/>
             </a:br>
@@ -5412,10 +5758,499 @@
   <p:clrMapOvr>
     <a:masterClrMapping/>
   </p:clrMapOvr>
+  <p:timing>
+    <p:tnLst>
+      <p:par>
+        <p:cTn id="1" dur="indefinite" restart="never" nodeType="tmRoot"/>
+      </p:par>
+    </p:tnLst>
+  </p:timing>
 </p:sld>
 </file>
 
 <file path=ppt/slides/slide10.xml><?xml version="1.0" encoding="utf-8"?>
+<p:sld xmlns:a="http://schemas.openxmlformats.org/drawingml/2006/main" xmlns:r="http://schemas.openxmlformats.org/officeDocument/2006/relationships" xmlns:p="http://schemas.openxmlformats.org/presentationml/2006/main">
+  <p:cSld>
+    <p:spTree>
+      <p:nvGrpSpPr>
+        <p:cNvPr id="1" name=""/>
+        <p:cNvGrpSpPr/>
+        <p:nvPr/>
+      </p:nvGrpSpPr>
+      <p:grpSpPr>
+        <a:xfrm>
+          <a:off x="0" y="0"/>
+          <a:ext cx="0" cy="0"/>
+          <a:chOff x="0" y="0"/>
+          <a:chExt cx="0" cy="0"/>
+        </a:xfrm>
+      </p:grpSpPr>
+      <p:sp>
+        <p:nvSpPr>
+          <p:cNvPr id="2" name="Content Placeholder 1"/>
+          <p:cNvSpPr>
+            <a:spLocks noGrp="1"/>
+          </p:cNvSpPr>
+          <p:nvPr>
+            <p:ph idx="1"/>
+          </p:nvPr>
+        </p:nvSpPr>
+        <p:spPr/>
+        <p:txBody>
+          <a:bodyPr/>
+          <a:lstStyle/>
+          <a:p>
+            <a:pPr marL="0" indent="0">
+              <a:buNone/>
+            </a:pPr>
+            <a:r>
+              <a:rPr lang="en-US" b="0" dirty="0"/>
+              <a:t>What could be </a:t>
+            </a:r>
+            <a:r>
+              <a:rPr lang="en-US" dirty="0"/>
+              <a:t>improved</a:t>
+            </a:r>
+            <a:r>
+              <a:rPr lang="en-US" b="0" dirty="0"/>
+              <a:t>, and </a:t>
+            </a:r>
+            <a:r>
+              <a:rPr lang="en-US" dirty="0"/>
+              <a:t>how</a:t>
+            </a:r>
+            <a:r>
+              <a:rPr lang="en-US" b="0" dirty="0" smtClean="0"/>
+              <a:t>?</a:t>
+            </a:r>
+          </a:p>
+          <a:p>
+            <a:pPr>
+              <a:buFontTx/>
+              <a:buChar char="-"/>
+            </a:pPr>
+            <a:r>
+              <a:rPr lang="en-US" sz="1600" b="0" dirty="0">
+                <a:sym typeface="Wingdings" panose="05000000000000000000" pitchFamily="2" charset="2"/>
+              </a:rPr>
+              <a:t>Brandon: HR support</a:t>
+            </a:r>
+          </a:p>
+          <a:p>
+            <a:pPr lvl="1">
+              <a:buFontTx/>
+              <a:buChar char="-"/>
+            </a:pPr>
+            <a:r>
+              <a:rPr lang="en-US" sz="1400" dirty="0">
+                <a:sym typeface="Wingdings" panose="05000000000000000000" pitchFamily="2" charset="2"/>
+              </a:rPr>
+              <a:t>Kim: HR improvement program in progress (next week)</a:t>
+            </a:r>
+          </a:p>
+          <a:p>
+            <a:pPr lvl="1">
+              <a:buFontTx/>
+              <a:buChar char="-"/>
+            </a:pPr>
+            <a:r>
+              <a:rPr lang="en-US" sz="1400" dirty="0">
+                <a:sym typeface="Wingdings" panose="05000000000000000000" pitchFamily="2" charset="2"/>
+              </a:rPr>
+              <a:t>Help writing job descriptions (more specific to the role)</a:t>
+            </a:r>
+          </a:p>
+          <a:p>
+            <a:pPr lvl="1">
+              <a:buFontTx/>
+              <a:buChar char="-"/>
+            </a:pPr>
+            <a:r>
+              <a:rPr lang="en-US" sz="1400" dirty="0">
+                <a:sym typeface="Wingdings" panose="05000000000000000000" pitchFamily="2" charset="2"/>
+              </a:rPr>
+              <a:t>More pre-screening of candidates – writing test?</a:t>
+            </a:r>
+          </a:p>
+          <a:p>
+            <a:pPr lvl="1">
+              <a:buFontTx/>
+              <a:buChar char="-"/>
+            </a:pPr>
+            <a:r>
+              <a:rPr lang="en-US" sz="1400" dirty="0">
+                <a:sym typeface="Wingdings" panose="05000000000000000000" pitchFamily="2" charset="2"/>
+              </a:rPr>
+              <a:t>Tracking – confusion about position, description, agency, departments, managers, team leaders, etc. Currently comes piecemeal, needs to be in a central location for managers to </a:t>
+            </a:r>
+            <a:r>
+              <a:rPr lang="en-US" sz="1400" dirty="0" smtClean="0">
+                <a:sym typeface="Wingdings" panose="05000000000000000000" pitchFamily="2" charset="2"/>
+              </a:rPr>
+              <a:t>access</a:t>
+            </a:r>
+            <a:endParaRPr lang="en-US" sz="1600" b="0" dirty="0" smtClean="0"/>
+          </a:p>
+          <a:p>
+            <a:pPr>
+              <a:buFontTx/>
+              <a:buChar char="-"/>
+            </a:pPr>
+            <a:r>
+              <a:rPr lang="en-US" sz="1600" b="0" dirty="0" smtClean="0"/>
+              <a:t>Could GLT connect terminated employees with recruiters? Or a link to job / unemployment resources as part of </a:t>
+            </a:r>
+            <a:r>
+              <a:rPr lang="en-US" sz="1600" b="0" dirty="0" err="1" smtClean="0"/>
+              <a:t>offboarding</a:t>
+            </a:r>
+            <a:r>
+              <a:rPr lang="en-US" sz="1600" b="0" dirty="0" smtClean="0"/>
+              <a:t>?</a:t>
+            </a:r>
+          </a:p>
+          <a:p>
+            <a:pPr lvl="1">
+              <a:buFontTx/>
+              <a:buChar char="-"/>
+            </a:pPr>
+            <a:r>
+              <a:rPr lang="en-US" sz="1400" dirty="0" smtClean="0"/>
+              <a:t>Termination vs laid off</a:t>
+            </a:r>
+            <a:endParaRPr lang="en-US" sz="1400" b="0" dirty="0" smtClean="0"/>
+          </a:p>
+          <a:p>
+            <a:pPr>
+              <a:buFontTx/>
+              <a:buChar char="-"/>
+            </a:pPr>
+            <a:r>
+              <a:rPr lang="en-US" sz="1600" b="0" dirty="0" smtClean="0"/>
+              <a:t>More formal processes</a:t>
+            </a:r>
+          </a:p>
+          <a:p>
+            <a:pPr>
+              <a:buFontTx/>
+              <a:buChar char="-"/>
+            </a:pPr>
+            <a:r>
+              <a:rPr lang="en-US" sz="1600" b="0" dirty="0" smtClean="0"/>
+              <a:t>With new employees: 30-60-90 reviews</a:t>
+            </a:r>
+          </a:p>
+          <a:p>
+            <a:pPr lvl="1">
+              <a:buFontTx/>
+              <a:buChar char="-"/>
+            </a:pPr>
+            <a:r>
+              <a:rPr lang="en-US" sz="1400" dirty="0" smtClean="0"/>
+              <a:t>One-on-one meetings with employees, check-in</a:t>
+            </a:r>
+          </a:p>
+          <a:p>
+            <a:pPr lvl="1">
+              <a:buFontTx/>
+              <a:buChar char="-"/>
+            </a:pPr>
+            <a:r>
+              <a:rPr lang="en-US" sz="1400" b="0" dirty="0" smtClean="0"/>
+              <a:t>Track professional development plan</a:t>
+            </a:r>
+          </a:p>
+          <a:p>
+            <a:pPr>
+              <a:buFontTx/>
+              <a:buChar char="-"/>
+            </a:pPr>
+            <a:r>
+              <a:rPr lang="en-US" sz="1600" b="0" dirty="0" smtClean="0"/>
+              <a:t>HR coverage</a:t>
+            </a:r>
+            <a:endParaRPr lang="en-US" sz="1600" b="0" dirty="0"/>
+          </a:p>
+        </p:txBody>
+      </p:sp>
+    </p:spTree>
+    <p:extLst>
+      <p:ext uri="{BB962C8B-B14F-4D97-AF65-F5344CB8AC3E}">
+        <p14:creationId xmlns:p14="http://schemas.microsoft.com/office/powerpoint/2010/main" val="4159895701"/>
+      </p:ext>
+    </p:extLst>
+  </p:cSld>
+  <p:clrMapOvr>
+    <a:masterClrMapping/>
+  </p:clrMapOvr>
+</p:sld>
+</file>
+
+<file path=ppt/slides/slide11.xml><?xml version="1.0" encoding="utf-8"?>
+<p:sld xmlns:a="http://schemas.openxmlformats.org/drawingml/2006/main" xmlns:r="http://schemas.openxmlformats.org/officeDocument/2006/relationships" xmlns:p="http://schemas.openxmlformats.org/presentationml/2006/main">
+  <p:cSld>
+    <p:spTree>
+      <p:nvGrpSpPr>
+        <p:cNvPr id="1" name=""/>
+        <p:cNvGrpSpPr/>
+        <p:nvPr/>
+      </p:nvGrpSpPr>
+      <p:grpSpPr>
+        <a:xfrm>
+          <a:off x="0" y="0"/>
+          <a:ext cx="0" cy="0"/>
+          <a:chOff x="0" y="0"/>
+          <a:chExt cx="0" cy="0"/>
+        </a:xfrm>
+      </p:grpSpPr>
+      <p:sp>
+        <p:nvSpPr>
+          <p:cNvPr id="2" name="Content Placeholder 1"/>
+          <p:cNvSpPr>
+            <a:spLocks noGrp="1"/>
+          </p:cNvSpPr>
+          <p:nvPr>
+            <p:ph idx="1"/>
+          </p:nvPr>
+        </p:nvSpPr>
+        <p:spPr/>
+        <p:txBody>
+          <a:bodyPr/>
+          <a:lstStyle/>
+          <a:p>
+            <a:pPr marL="0" indent="0">
+              <a:buNone/>
+            </a:pPr>
+            <a:r>
+              <a:rPr lang="en-US" b="0" dirty="0"/>
+              <a:t>Activities / actions to </a:t>
+            </a:r>
+            <a:r>
+              <a:rPr lang="en-US" dirty="0"/>
+              <a:t>sustain</a:t>
+            </a:r>
+          </a:p>
+          <a:p>
+            <a:pPr>
+              <a:buFontTx/>
+              <a:buChar char="-"/>
+            </a:pPr>
+            <a:r>
+              <a:rPr lang="en-US" sz="1600" b="0" dirty="0" smtClean="0"/>
+              <a:t>Empathy</a:t>
+            </a:r>
+          </a:p>
+          <a:p>
+            <a:pPr lvl="1">
+              <a:buFontTx/>
+              <a:buChar char="-"/>
+            </a:pPr>
+            <a:r>
+              <a:rPr lang="en-US" sz="1400" dirty="0" smtClean="0"/>
+              <a:t>From a company perspective</a:t>
+            </a:r>
+          </a:p>
+          <a:p>
+            <a:pPr lvl="1">
+              <a:buFontTx/>
+              <a:buChar char="-"/>
+            </a:pPr>
+            <a:r>
+              <a:rPr lang="en-US" sz="1400" dirty="0" smtClean="0"/>
+              <a:t>Open communication</a:t>
+            </a:r>
+          </a:p>
+          <a:p>
+            <a:pPr lvl="1">
+              <a:buFontTx/>
+              <a:buChar char="-"/>
+            </a:pPr>
+            <a:r>
+              <a:rPr lang="en-US" sz="1400" dirty="0" smtClean="0"/>
+              <a:t>Try to place elsewhere to new positions in company</a:t>
+            </a:r>
+            <a:endParaRPr lang="en-US" sz="1400" dirty="0"/>
+          </a:p>
+        </p:txBody>
+      </p:sp>
+    </p:spTree>
+    <p:extLst>
+      <p:ext uri="{BB962C8B-B14F-4D97-AF65-F5344CB8AC3E}">
+        <p14:creationId xmlns:p14="http://schemas.microsoft.com/office/powerpoint/2010/main" val="155056536"/>
+      </p:ext>
+    </p:extLst>
+  </p:cSld>
+  <p:clrMapOvr>
+    <a:masterClrMapping/>
+  </p:clrMapOvr>
+</p:sld>
+</file>
+
+<file path=ppt/slides/slide12.xml><?xml version="1.0" encoding="utf-8"?>
+<p:sld xmlns:a="http://schemas.openxmlformats.org/drawingml/2006/main" xmlns:r="http://schemas.openxmlformats.org/officeDocument/2006/relationships" xmlns:p="http://schemas.openxmlformats.org/presentationml/2006/main">
+  <p:cSld>
+    <p:spTree>
+      <p:nvGrpSpPr>
+        <p:cNvPr id="1" name=""/>
+        <p:cNvGrpSpPr/>
+        <p:nvPr/>
+      </p:nvGrpSpPr>
+      <p:grpSpPr>
+        <a:xfrm>
+          <a:off x="0" y="0"/>
+          <a:ext cx="0" cy="0"/>
+          <a:chOff x="0" y="0"/>
+          <a:chExt cx="0" cy="0"/>
+        </a:xfrm>
+      </p:grpSpPr>
+      <p:sp>
+        <p:nvSpPr>
+          <p:cNvPr id="2" name="Content Placeholder 1">
+            <a:extLst>
+              <a:ext uri="{FF2B5EF4-FFF2-40B4-BE49-F238E27FC236}">
+                <a16:creationId xmlns:a16="http://schemas.microsoft.com/office/drawing/2014/main" id="{7CD2DEBC-0D09-4598-A0F4-CC5F8DA2CA0C}"/>
+              </a:ext>
+            </a:extLst>
+          </p:cNvPr>
+          <p:cNvSpPr>
+            <a:spLocks noGrp="1"/>
+          </p:cNvSpPr>
+          <p:nvPr>
+            <p:ph idx="1"/>
+          </p:nvPr>
+        </p:nvSpPr>
+        <p:spPr/>
+        <p:txBody>
+          <a:bodyPr/>
+          <a:lstStyle/>
+          <a:p>
+            <a:pPr marL="0" indent="0">
+              <a:buNone/>
+            </a:pPr>
+            <a:r>
+              <a:rPr lang="en-US" b="0" dirty="0"/>
+              <a:t>Activities / actions to </a:t>
+            </a:r>
+            <a:r>
+              <a:rPr lang="en-US" dirty="0"/>
+              <a:t>improve </a:t>
+            </a:r>
+            <a:r>
+              <a:rPr lang="en-US" b="0" dirty="0"/>
+              <a:t>or </a:t>
+            </a:r>
+            <a:r>
+              <a:rPr lang="en-US" dirty="0"/>
+              <a:t>avoid</a:t>
+            </a:r>
+          </a:p>
+          <a:p>
+            <a:pPr>
+              <a:buFontTx/>
+              <a:buChar char="-"/>
+            </a:pPr>
+            <a:r>
+              <a:rPr lang="en-US" sz="1600" b="0" dirty="0" smtClean="0"/>
+              <a:t>Need PIP for low performance reviews</a:t>
+            </a:r>
+          </a:p>
+          <a:p>
+            <a:pPr>
+              <a:buFontTx/>
+              <a:buChar char="-"/>
+            </a:pPr>
+            <a:r>
+              <a:rPr lang="en-US" sz="1600" b="0" dirty="0" smtClean="0"/>
+              <a:t>Formal review periods for new hires</a:t>
+            </a:r>
+          </a:p>
+          <a:p>
+            <a:pPr>
+              <a:buFontTx/>
+              <a:buChar char="-"/>
+            </a:pPr>
+            <a:r>
+              <a:rPr lang="en-US" sz="1600" b="0" dirty="0" smtClean="0"/>
+              <a:t>Documentation</a:t>
+            </a:r>
+          </a:p>
+          <a:p>
+            <a:pPr lvl="1">
+              <a:buFontTx/>
+              <a:buChar char="-"/>
+            </a:pPr>
+            <a:r>
+              <a:rPr lang="en-US" sz="1400" dirty="0" smtClean="0"/>
+              <a:t>Provide relevant files from HR system to employee on termination</a:t>
+            </a:r>
+            <a:endParaRPr lang="en-US" sz="1400" b="0" dirty="0" smtClean="0"/>
+          </a:p>
+          <a:p>
+            <a:pPr lvl="1">
+              <a:buFontTx/>
+              <a:buChar char="-"/>
+            </a:pPr>
+            <a:r>
+              <a:rPr lang="en-US" sz="1400" dirty="0" smtClean="0"/>
+              <a:t>Written review plans/performance, bcc to HR </a:t>
+            </a:r>
+          </a:p>
+          <a:p>
+            <a:pPr>
+              <a:buFontTx/>
+              <a:buChar char="-"/>
+            </a:pPr>
+            <a:r>
+              <a:rPr lang="en-US" sz="1600" b="0" dirty="0" smtClean="0"/>
+              <a:t>Training for Managers</a:t>
+            </a:r>
+          </a:p>
+          <a:p>
+            <a:pPr lvl="1">
+              <a:buFontTx/>
+              <a:buChar char="-"/>
+            </a:pPr>
+            <a:r>
+              <a:rPr lang="en-US" sz="1400" dirty="0" smtClean="0"/>
+              <a:t>Termination procedures</a:t>
+            </a:r>
+          </a:p>
+          <a:p>
+            <a:pPr lvl="1">
+              <a:buFontTx/>
+              <a:buChar char="-"/>
+            </a:pPr>
+            <a:r>
+              <a:rPr lang="en-US" sz="1400" dirty="0" smtClean="0"/>
+              <a:t>Counseling</a:t>
+            </a:r>
+          </a:p>
+          <a:p>
+            <a:pPr>
+              <a:buFontTx/>
+              <a:buChar char="-"/>
+            </a:pPr>
+            <a:r>
+              <a:rPr lang="en-US" sz="1600" b="0" dirty="0" smtClean="0"/>
+              <a:t>HR coverage</a:t>
+            </a:r>
+          </a:p>
+        </p:txBody>
+      </p:sp>
+    </p:spTree>
+    <p:extLst>
+      <p:ext uri="{BB962C8B-B14F-4D97-AF65-F5344CB8AC3E}">
+        <p14:creationId xmlns:p14="http://schemas.microsoft.com/office/powerpoint/2010/main" val="617521990"/>
+      </p:ext>
+    </p:extLst>
+  </p:cSld>
+  <p:clrMapOvr>
+    <a:masterClrMapping/>
+  </p:clrMapOvr>
+</p:sld>
+</file>
+
+<file path=ppt/slides/slide13.xml><?xml version="1.0" encoding="utf-8"?>
 <p:sld xmlns:a="http://schemas.openxmlformats.org/drawingml/2006/main" xmlns:r="http://schemas.openxmlformats.org/officeDocument/2006/relationships" xmlns:p="http://schemas.openxmlformats.org/presentationml/2006/main">
   <p:cSld>
     <p:spTree>
@@ -5552,14 +6387,30 @@
           <a:p>
             <a:r>
               <a:rPr lang="en-US" b="0" dirty="0"/>
-              <a:t>Brandon Fogarty</a:t>
-            </a:r>
+              <a:t>Brandon </a:t>
+            </a:r>
+            <a:r>
+              <a:rPr lang="en-US" b="0" dirty="0" smtClean="0"/>
+              <a:t>Fogarty</a:t>
+            </a:r>
+          </a:p>
+          <a:p>
+            <a:r>
+              <a:rPr lang="en-US" b="0" dirty="0" smtClean="0"/>
+              <a:t>Andrea Brown</a:t>
+            </a:r>
+            <a:endParaRPr lang="en-US" b="0" dirty="0"/>
           </a:p>
           <a:p>
             <a:r>
               <a:rPr lang="en-US" b="0" dirty="0"/>
-              <a:t>Kim Dorner</a:t>
-            </a:r>
+              <a:t>Kim </a:t>
+            </a:r>
+            <a:r>
+              <a:rPr lang="en-US" b="0" dirty="0" smtClean="0"/>
+              <a:t>Doner</a:t>
+            </a:r>
+            <a:endParaRPr lang="en-US" b="0" dirty="0"/>
           </a:p>
           <a:p>
             <a:r>
@@ -5579,6 +6430,13 @@
   <p:clrMapOvr>
     <a:masterClrMapping/>
   </p:clrMapOvr>
+  <p:timing>
+    <p:tnLst>
+      <p:par>
+        <p:cTn id="1" dur="indefinite" restart="never" nodeType="tmRoot"/>
+      </p:par>
+    </p:tnLst>
+  </p:timing>
 </p:sld>
 </file>
 
@@ -5634,8 +6492,13 @@
             </a:pPr>
             <a:r>
               <a:rPr lang="en-US" b="0" dirty="0"/>
-              <a:t>Date of event: [date]</a:t>
-            </a:r>
+              <a:t>Date of event: </a:t>
+            </a:r>
+            <a:r>
+              <a:rPr lang="en-US" b="0" dirty="0" smtClean="0"/>
+              <a:t>2022-02-25</a:t>
+            </a:r>
+            <a:endParaRPr lang="en-US" b="0" dirty="0"/>
           </a:p>
           <a:p>
             <a:pPr marL="0" indent="0">
@@ -5733,13 +6596,33 @@
             </a:r>
           </a:p>
           <a:p>
-            <a:pPr marL="0" indent="0">
-              <a:buNone/>
-            </a:pPr>
-            <a:r>
-              <a:rPr lang="en-US" sz="1600" b="0" dirty="0"/>
-              <a:t>- </a:t>
-            </a:r>
+            <a:pPr>
+              <a:buFontTx/>
+              <a:buChar char="-"/>
+            </a:pPr>
+            <a:r>
+              <a:rPr lang="en-US" sz="1600" b="0" dirty="0" smtClean="0"/>
+              <a:t>GLT decided to part ways with employee</a:t>
+            </a:r>
+          </a:p>
+          <a:p>
+            <a:pPr>
+              <a:buFontTx/>
+              <a:buChar char="-"/>
+            </a:pPr>
+            <a:r>
+              <a:rPr lang="en-US" sz="1600" b="0" dirty="0" smtClean="0"/>
+              <a:t>GLT policy is to not provide notice to </a:t>
+            </a:r>
+            <a:r>
+              <a:rPr lang="en-US" sz="1600" b="0" dirty="0" err="1" smtClean="0"/>
+              <a:t>offboarded</a:t>
+            </a:r>
+            <a:r>
+              <a:rPr lang="en-US" sz="1600" b="0" dirty="0" smtClean="0"/>
+              <a:t> employees</a:t>
+            </a:r>
+            <a:endParaRPr lang="en-US" sz="1600" b="0" dirty="0"/>
           </a:p>
         </p:txBody>
       </p:sp>
@@ -5797,13 +6680,164 @@
             </a:r>
           </a:p>
           <a:p>
+            <a:pPr>
+              <a:buFontTx/>
+              <a:buChar char="-"/>
+            </a:pPr>
+            <a:r>
+              <a:rPr lang="en-US" sz="1600" b="0" dirty="0" smtClean="0"/>
+              <a:t>Managers decided to </a:t>
+            </a:r>
+            <a:r>
+              <a:rPr lang="en-US" sz="1600" b="0" dirty="0" err="1" smtClean="0"/>
+              <a:t>offboard</a:t>
+            </a:r>
+            <a:r>
+              <a:rPr lang="en-US" sz="1600" b="0" dirty="0" smtClean="0"/>
+              <a:t> employee</a:t>
+            </a:r>
+          </a:p>
+          <a:p>
+            <a:pPr lvl="1">
+              <a:buFontTx/>
+              <a:buChar char="-"/>
+            </a:pPr>
+            <a:r>
+              <a:rPr lang="en-US" sz="1400" dirty="0" smtClean="0"/>
+              <a:t>Consistent errors, remediation attempted</a:t>
+            </a:r>
+          </a:p>
+          <a:p>
+            <a:pPr lvl="1">
+              <a:buFontTx/>
+              <a:buChar char="-"/>
+            </a:pPr>
+            <a:r>
+              <a:rPr lang="en-US" sz="1400" b="0" dirty="0" smtClean="0"/>
+              <a:t>Reviewed work product</a:t>
+            </a:r>
+          </a:p>
+          <a:p>
+            <a:pPr lvl="1">
+              <a:buFontTx/>
+              <a:buChar char="-"/>
+            </a:pPr>
+            <a:r>
+              <a:rPr lang="en-US" sz="1400" dirty="0" smtClean="0"/>
+              <a:t>No improvem</a:t>
+            </a:r>
+            <a:r>
+              <a:rPr lang="en-US" sz="1400" dirty="0" smtClean="0"/>
+              <a:t>ent</a:t>
+            </a:r>
+          </a:p>
+          <a:p>
+            <a:pPr lvl="1">
+              <a:buFontTx/>
+              <a:buChar char="-"/>
+            </a:pPr>
+            <a:r>
+              <a:rPr lang="en-US" sz="1400" b="0" dirty="0" smtClean="0"/>
+              <a:t>Performance had been an issue</a:t>
+            </a:r>
+          </a:p>
+          <a:p>
+            <a:pPr lvl="1">
+              <a:buFontTx/>
+              <a:buChar char="-"/>
+            </a:pPr>
+            <a:r>
+              <a:rPr lang="en-US" sz="1400" dirty="0" smtClean="0"/>
+              <a:t>Employee notified on several occasions re performance, written &amp; verbal</a:t>
+            </a:r>
+          </a:p>
+          <a:p>
+            <a:pPr>
+              <a:buFontTx/>
+              <a:buChar char="-"/>
+            </a:pPr>
+            <a:r>
+              <a:rPr lang="en-US" sz="1600" b="0" dirty="0" smtClean="0"/>
+              <a:t>Employee response</a:t>
+            </a:r>
+          </a:p>
+          <a:p>
+            <a:pPr lvl="1">
+              <a:buFontTx/>
+              <a:buChar char="-"/>
+            </a:pPr>
+            <a:r>
+              <a:rPr lang="en-US" sz="1400" dirty="0" smtClean="0"/>
+              <a:t>No “pushback”, accepted review and criticism</a:t>
+            </a:r>
+            <a:endParaRPr lang="en-US" sz="1400" b="0" dirty="0" smtClean="0"/>
+          </a:p>
+          <a:p>
+            <a:pPr>
+              <a:buFontTx/>
+              <a:buChar char="-"/>
+            </a:pPr>
+            <a:r>
+              <a:rPr lang="en-US" sz="1600" b="0" dirty="0" smtClean="0"/>
+              <a:t>Difficulty finding replacement</a:t>
+            </a:r>
+          </a:p>
+          <a:p>
+            <a:pPr lvl="1">
+              <a:buFontTx/>
+              <a:buChar char="-"/>
+            </a:pPr>
+            <a:r>
+              <a:rPr lang="en-US" sz="1400" dirty="0" smtClean="0"/>
+              <a:t>Rep not found until Feb</a:t>
+            </a:r>
+          </a:p>
+          <a:p>
+            <a:pPr lvl="1">
+              <a:buFontTx/>
+              <a:buChar char="-"/>
+            </a:pPr>
+            <a:r>
+              <a:rPr lang="en-US" sz="1400" b="0" dirty="0" smtClean="0"/>
+              <a:t>Didn’t want to leave position vacant</a:t>
+            </a:r>
+          </a:p>
+          <a:p>
+            <a:pPr lvl="1">
+              <a:buFontTx/>
+              <a:buChar char="-"/>
+            </a:pPr>
+            <a:r>
+              <a:rPr lang="en-US" sz="1400" dirty="0" smtClean="0"/>
+              <a:t>Replacement found mid-Feb, started late Feb</a:t>
+            </a:r>
+          </a:p>
+          <a:p>
+            <a:pPr>
+              <a:buFontTx/>
+              <a:buChar char="-"/>
+            </a:pPr>
+            <a:r>
+              <a:rPr lang="en-US" sz="1600" b="0" dirty="0" smtClean="0"/>
+              <a:t>GLT expects four weeks notice, does not provide notice to employees</a:t>
+            </a:r>
+          </a:p>
+          <a:p>
+            <a:pPr lvl="1">
+              <a:buFontTx/>
+              <a:buChar char="-"/>
+            </a:pPr>
+            <a:r>
+              <a:rPr lang="en-US" sz="1200" dirty="0" smtClean="0"/>
+              <a:t>Executive decision to not provide notice due to risk of reputational harm to firm</a:t>
+            </a:r>
+            <a:endParaRPr lang="en-US" sz="1200" b="0" dirty="0"/>
+          </a:p>
+          <a:p>
             <a:pPr marL="0" indent="0">
               <a:buNone/>
             </a:pPr>
-            <a:r>
-              <a:rPr lang="en-US" sz="1600" dirty="0"/>
-              <a:t>-</a:t>
-            </a:r>
+            <a:endParaRPr lang="en-US" sz="1600" b="0" dirty="0" smtClean="0"/>
           </a:p>
         </p:txBody>
       </p:sp>
@@ -5856,42 +6890,145 @@
               <a:buNone/>
             </a:pPr>
             <a:r>
-              <a:rPr lang="en-US" b="0" dirty="0"/>
-              <a:t>What </a:t>
-            </a:r>
-            <a:r>
               <a:rPr lang="en-US" dirty="0"/>
-              <a:t>went well</a:t>
-            </a:r>
-            <a:r>
-              <a:rPr lang="en-US" b="0" dirty="0"/>
-              <a:t>, and </a:t>
-            </a:r>
-            <a:r>
-              <a:rPr lang="en-US" dirty="0"/>
-              <a:t>why</a:t>
-            </a:r>
-            <a:r>
-              <a:rPr lang="en-US" b="0" dirty="0"/>
+              <a:t>What actually occurred</a:t>
+            </a:r>
+            <a:r>
+              <a:rPr lang="en-US" dirty="0" smtClean="0"/>
               <a:t>?</a:t>
             </a:r>
+          </a:p>
+          <a:p>
+            <a:pPr>
+              <a:buFontTx/>
+              <a:buChar char="-"/>
+            </a:pPr>
+            <a:r>
+              <a:rPr lang="en-US" sz="1600" b="0" dirty="0" smtClean="0"/>
+              <a:t>Does not providing notice protect from that risk?</a:t>
+            </a:r>
+          </a:p>
+          <a:p>
+            <a:pPr lvl="1">
+              <a:buFontTx/>
+              <a:buChar char="-"/>
+            </a:pPr>
+            <a:r>
+              <a:rPr lang="en-US" sz="1400" dirty="0" smtClean="0"/>
+              <a:t>Employee may feel slighted by non-notice and this may increase the risk of harm</a:t>
+            </a:r>
+          </a:p>
+          <a:p>
+            <a:pPr>
+              <a:buFontTx/>
+              <a:buChar char="-"/>
+            </a:pPr>
+            <a:r>
+              <a:rPr lang="en-US" sz="1600" b="0" dirty="0" smtClean="0"/>
+              <a:t>Past split caused issue</a:t>
+            </a:r>
+            <a:endParaRPr lang="en-US" sz="1600" b="0" dirty="0"/>
           </a:p>
           <a:p>
             <a:pPr marL="0" indent="0">
               <a:buNone/>
             </a:pPr>
-            <a:r>
-              <a:rPr lang="en-US" sz="1600" b="0" dirty="0"/>
-              <a:t>-</a:t>
-            </a:r>
-            <a:endParaRPr lang="en-US" b="0" dirty="0"/>
+            <a:endParaRPr lang="en-US" sz="1600" b="0" dirty="0" smtClean="0"/>
+          </a:p>
+          <a:p>
+            <a:pPr marL="0" indent="0">
+              <a:buNone/>
+            </a:pPr>
+            <a:r>
+              <a:rPr lang="en-US" sz="1600" b="0" dirty="0" smtClean="0"/>
+              <a:t>Employee response to firing</a:t>
+            </a:r>
+          </a:p>
+          <a:p>
+            <a:pPr>
+              <a:buFontTx/>
+              <a:buChar char="-"/>
+            </a:pPr>
+            <a:r>
+              <a:rPr lang="en-US" sz="1600" b="0" dirty="0" smtClean="0"/>
+              <a:t>Unexpected, shocked</a:t>
+            </a:r>
+          </a:p>
+          <a:p>
+            <a:pPr>
+              <a:buFontTx/>
+              <a:buChar char="-"/>
+            </a:pPr>
+            <a:r>
+              <a:rPr lang="en-US" sz="1600" b="0" dirty="0" smtClean="0"/>
+              <a:t>Brandon – I would have expected “red flag”</a:t>
+            </a:r>
+          </a:p>
+          <a:p>
+            <a:pPr>
+              <a:buFontTx/>
+              <a:buChar char="-"/>
+            </a:pPr>
+            <a:r>
+              <a:rPr lang="en-US" sz="1600" b="0" dirty="0" smtClean="0"/>
+              <a:t>After her review, employee sent response indicating she would improve</a:t>
+            </a:r>
+          </a:p>
+          <a:p>
+            <a:pPr>
+              <a:buFontTx/>
+              <a:buChar char="-"/>
+            </a:pPr>
+            <a:r>
+              <a:rPr lang="en-US" sz="1600" b="0" dirty="0" smtClean="0"/>
+              <a:t>Focused on financial implications of firing</a:t>
+            </a:r>
+            <a:endParaRPr lang="en-US" sz="1600" b="0" dirty="0"/>
+          </a:p>
+          <a:p>
+            <a:pPr marL="0" indent="0">
+              <a:buNone/>
+            </a:pPr>
+            <a:r>
+              <a:rPr lang="en-US" sz="1600" b="0" dirty="0" smtClean="0"/>
+              <a:t>Former employee trying to connect with Kim on LinkedIn</a:t>
+            </a:r>
+          </a:p>
+          <a:p>
+            <a:pPr marL="0" indent="0">
+              <a:buNone/>
+            </a:pPr>
+            <a:r>
+              <a:rPr lang="en-US" sz="1600" b="0" dirty="0" smtClean="0"/>
+              <a:t>She reached out to former team members</a:t>
+            </a:r>
+            <a:endParaRPr lang="en-US" sz="1600" b="0" dirty="0"/>
+          </a:p>
+          <a:p>
+            <a:pPr>
+              <a:buFontTx/>
+              <a:buChar char="-"/>
+            </a:pPr>
+            <a:r>
+              <a:rPr lang="en-US" sz="1600" b="0" dirty="0" smtClean="0"/>
+              <a:t>Probably not an issue</a:t>
+            </a:r>
+          </a:p>
+          <a:p>
+            <a:pPr marL="0" indent="0">
+              <a:buNone/>
+            </a:pPr>
+            <a:r>
+              <a:rPr lang="en-US" sz="1600" b="0" dirty="0" smtClean="0"/>
+              <a:t>Found another position</a:t>
+            </a:r>
           </a:p>
         </p:txBody>
       </p:sp>
     </p:spTree>
     <p:extLst>
       <p:ext uri="{BB962C8B-B14F-4D97-AF65-F5344CB8AC3E}">
-        <p14:creationId xmlns:p14="http://schemas.microsoft.com/office/powerpoint/2010/main" val="935940639"/>
+        <p14:creationId xmlns:p14="http://schemas.microsoft.com/office/powerpoint/2010/main" val="2985077549"/>
       </p:ext>
     </p:extLst>
   </p:cSld>
@@ -5937,23 +7074,11 @@
               <a:buNone/>
             </a:pPr>
             <a:r>
-              <a:rPr lang="en-US" b="0" dirty="0"/>
-              <a:t>What could be </a:t>
-            </a:r>
-            <a:r>
               <a:rPr lang="en-US" dirty="0"/>
-              <a:t>improved</a:t>
-            </a:r>
-            <a:r>
-              <a:rPr lang="en-US" b="0" dirty="0"/>
-              <a:t>, and </a:t>
-            </a:r>
-            <a:r>
-              <a:rPr lang="en-US" dirty="0"/>
-              <a:t>how</a:t>
-            </a:r>
-            <a:r>
-              <a:rPr lang="en-US" b="0" dirty="0"/>
+              <a:t>What actually occurred</a:t>
+            </a:r>
+            <a:r>
+              <a:rPr lang="en-US" dirty="0" smtClean="0"/>
               <a:t>?</a:t>
             </a:r>
           </a:p>
@@ -5961,17 +7086,124 @@
             <a:pPr marL="0" indent="0">
               <a:buNone/>
             </a:pPr>
+            <a:endParaRPr lang="en-US" sz="1600" b="0" dirty="0" smtClean="0"/>
+          </a:p>
+          <a:p>
+            <a:pPr marL="0" indent="0">
+              <a:buNone/>
+            </a:pPr>
+            <a:r>
+              <a:rPr lang="en-US" sz="1600" b="0" dirty="0" smtClean="0"/>
+              <a:t>Employee </a:t>
+            </a:r>
             <a:r>
               <a:rPr lang="en-US" sz="1600" b="0" dirty="0"/>
-              <a:t>- </a:t>
-            </a:r>
+              <a:t>needed data from </a:t>
+            </a:r>
+            <a:r>
+              <a:rPr lang="en-US" sz="1600" b="0" dirty="0" err="1"/>
+              <a:t>iSolved</a:t>
+            </a:r>
+            <a:r>
+              <a:rPr lang="en-US" sz="1600" b="0" dirty="0"/>
+              <a:t> for unemployment but no longer had </a:t>
+            </a:r>
+            <a:r>
+              <a:rPr lang="en-US" sz="1600" b="0" dirty="0" smtClean="0"/>
+              <a:t>access</a:t>
+            </a:r>
+          </a:p>
+          <a:p>
+            <a:pPr>
+              <a:buFontTx/>
+              <a:buChar char="-"/>
+            </a:pPr>
+            <a:r>
+              <a:rPr lang="en-US" sz="1600" b="0" dirty="0" smtClean="0"/>
+              <a:t>Brandon called Ivan directly, he facilitated</a:t>
+            </a:r>
+          </a:p>
+          <a:p>
+            <a:pPr marL="0" indent="0">
+              <a:buNone/>
+            </a:pPr>
+            <a:r>
+              <a:rPr lang="en-US" sz="1600" b="0" dirty="0" smtClean="0"/>
+              <a:t>Documentation of warnings</a:t>
+            </a:r>
+          </a:p>
+          <a:p>
+            <a:pPr>
+              <a:buFontTx/>
+              <a:buChar char="-"/>
+            </a:pPr>
+            <a:r>
+              <a:rPr lang="en-US" sz="1600" b="0" dirty="0" smtClean="0"/>
+              <a:t>Shared with HR</a:t>
+            </a:r>
+          </a:p>
+          <a:p>
+            <a:pPr>
+              <a:buFontTx/>
+              <a:buChar char="-"/>
+            </a:pPr>
+            <a:r>
+              <a:rPr lang="en-US" sz="1600" b="0" dirty="0" smtClean="0"/>
+              <a:t>Ivan asked Brandon to fill out paperwork for VA (state) recording warnings, etc.</a:t>
+            </a:r>
+          </a:p>
+          <a:p>
+            <a:pPr marL="0" indent="0">
+              <a:buNone/>
+            </a:pPr>
+            <a:r>
+              <a:rPr lang="en-US" sz="1600" b="0" dirty="0" smtClean="0"/>
+              <a:t>Communication over multiple channels</a:t>
+            </a:r>
+          </a:p>
+          <a:p>
+            <a:pPr>
+              <a:buFontTx/>
+              <a:buChar char="-"/>
+            </a:pPr>
+            <a:r>
+              <a:rPr lang="en-US" sz="1600" b="0" dirty="0" smtClean="0"/>
+              <a:t>Ivan on vacation</a:t>
+            </a:r>
+          </a:p>
+          <a:p>
+            <a:pPr>
+              <a:buFontTx/>
+              <a:buChar char="-"/>
+            </a:pPr>
+            <a:r>
+              <a:rPr lang="en-US" sz="1600" b="0" dirty="0" smtClean="0"/>
+              <a:t>Text messages</a:t>
+            </a:r>
+          </a:p>
+          <a:p>
+            <a:pPr>
+              <a:buFontTx/>
+              <a:buChar char="-"/>
+            </a:pPr>
+            <a:r>
+              <a:rPr lang="en-US" sz="1600" b="0" dirty="0" smtClean="0"/>
+              <a:t>Phone calls</a:t>
+            </a:r>
+          </a:p>
+          <a:p>
+            <a:pPr>
+              <a:buFontTx/>
+              <a:buChar char="-"/>
+            </a:pPr>
+            <a:endParaRPr lang="en-US" sz="1600" b="0" dirty="0" smtClean="0"/>
           </a:p>
         </p:txBody>
       </p:sp>
     </p:spTree>
     <p:extLst>
       <p:ext uri="{BB962C8B-B14F-4D97-AF65-F5344CB8AC3E}">
-        <p14:creationId xmlns:p14="http://schemas.microsoft.com/office/powerpoint/2010/main" val="258962402"/>
+        <p14:creationId xmlns:p14="http://schemas.microsoft.com/office/powerpoint/2010/main" val="725322905"/>
       </p:ext>
     </p:extLst>
   </p:cSld>
@@ -6018,20 +7250,91 @@
             </a:pPr>
             <a:r>
               <a:rPr lang="en-US" b="0" dirty="0"/>
-              <a:t>Activities / actions to </a:t>
+              <a:t>What </a:t>
             </a:r>
             <a:r>
               <a:rPr lang="en-US" dirty="0"/>
-              <a:t>sustain</a:t>
-            </a:r>
-          </a:p>
-          <a:p>
-            <a:pPr marL="0" indent="0">
-              <a:buNone/>
-            </a:pPr>
-            <a:r>
-              <a:rPr lang="en-US" sz="1600" dirty="0"/>
-              <a:t>- </a:t>
+              <a:t>went well</a:t>
+            </a:r>
+            <a:r>
+              <a:rPr lang="en-US" b="0" dirty="0"/>
+              <a:t>, and </a:t>
+            </a:r>
+            <a:r>
+              <a:rPr lang="en-US" dirty="0"/>
+              <a:t>why</a:t>
+            </a:r>
+            <a:r>
+              <a:rPr lang="en-US" b="0" dirty="0"/>
+              <a:t>?</a:t>
+            </a:r>
+          </a:p>
+          <a:p>
+            <a:pPr>
+              <a:buFontTx/>
+              <a:buChar char="-"/>
+            </a:pPr>
+            <a:r>
+              <a:rPr lang="en-US" sz="1600" b="0" dirty="0" smtClean="0"/>
+              <a:t>GLT looked for opportunities to place employee in another company role</a:t>
+            </a:r>
+          </a:p>
+          <a:p>
+            <a:pPr>
+              <a:buFontTx/>
+              <a:buChar char="-"/>
+            </a:pPr>
+            <a:r>
+              <a:rPr lang="en-US" sz="1600" b="0" dirty="0" smtClean="0"/>
+              <a:t>Empathy</a:t>
+            </a:r>
+          </a:p>
+          <a:p>
+            <a:pPr>
+              <a:buFontTx/>
+              <a:buChar char="-"/>
+            </a:pPr>
+            <a:r>
+              <a:rPr lang="en-US" sz="1600" b="0" dirty="0" smtClean="0"/>
+              <a:t>Managers did a good job of communicating</a:t>
+            </a:r>
+          </a:p>
+          <a:p>
+            <a:pPr lvl="1">
+              <a:buFontTx/>
+              <a:buChar char="-"/>
+            </a:pPr>
+            <a:r>
+              <a:rPr lang="en-US" dirty="0" smtClean="0"/>
+              <a:t>Emails, teams, phone calls</a:t>
+            </a:r>
+          </a:p>
+          <a:p>
+            <a:pPr lvl="1">
+              <a:buFontTx/>
+              <a:buChar char="-"/>
+            </a:pPr>
+            <a:r>
+              <a:rPr lang="en-US" dirty="0" smtClean="0"/>
+              <a:t>Discussed at weekly meeting</a:t>
+            </a:r>
+          </a:p>
+          <a:p>
+            <a:pPr>
+              <a:buFontTx/>
+              <a:buChar char="-"/>
+            </a:pPr>
+            <a:r>
+              <a:rPr lang="en-US" b="0" dirty="0" smtClean="0"/>
+              <a:t>HR provides basic </a:t>
+            </a:r>
+            <a:r>
+              <a:rPr lang="en-US" b="0" dirty="0" err="1" smtClean="0"/>
+              <a:t>nec</a:t>
+            </a:r>
+            <a:r>
+              <a:rPr lang="en-US" b="0" dirty="0" smtClean="0"/>
+              <a:t> info already</a:t>
             </a:r>
           </a:p>
         </p:txBody>
@@ -6039,7 +7342,7 @@
     </p:spTree>
     <p:extLst>
       <p:ext uri="{BB962C8B-B14F-4D97-AF65-F5344CB8AC3E}">
-        <p14:creationId xmlns:p14="http://schemas.microsoft.com/office/powerpoint/2010/main" val="155056536"/>
+        <p14:creationId xmlns:p14="http://schemas.microsoft.com/office/powerpoint/2010/main" val="935940639"/>
       </p:ext>
     </p:extLst>
   </p:cSld>
@@ -6068,13 +7371,7 @@
       </p:grpSpPr>
       <p:sp>
         <p:nvSpPr>
-          <p:cNvPr id="2" name="Content Placeholder 1">
-            <a:extLst>
-              <a:ext uri="{FF2B5EF4-FFF2-40B4-BE49-F238E27FC236}">
-                <a16:creationId xmlns:a16="http://schemas.microsoft.com/office/drawing/2014/main" id="{7CD2DEBC-0D09-4598-A0F4-CC5F8DA2CA0C}"/>
-              </a:ext>
-            </a:extLst>
-          </p:cNvPr>
+          <p:cNvPr id="2" name="Content Placeholder 1"/>
           <p:cNvSpPr>
             <a:spLocks noGrp="1"/>
           </p:cNvSpPr>
@@ -6092,28 +7389,154 @@
             </a:pPr>
             <a:r>
               <a:rPr lang="en-US" b="0" dirty="0"/>
-              <a:t>Activities / actions to </a:t>
+              <a:t>What could be </a:t>
             </a:r>
             <a:r>
               <a:rPr lang="en-US" dirty="0"/>
-              <a:t>improve </a:t>
+              <a:t>improved</a:t>
             </a:r>
             <a:r>
               <a:rPr lang="en-US" b="0" dirty="0"/>
-              <a:t>or </a:t>
+              <a:t>, and </a:t>
             </a:r>
             <a:r>
               <a:rPr lang="en-US" dirty="0"/>
-              <a:t>avoid</a:t>
-            </a:r>
-          </a:p>
-          <a:p>
-            <a:pPr marL="0" indent="0">
-              <a:buNone/>
-            </a:pPr>
-            <a:r>
-              <a:rPr lang="en-US" sz="1600" dirty="0"/>
-              <a:t>- </a:t>
+              <a:t>how</a:t>
+            </a:r>
+            <a:r>
+              <a:rPr lang="en-US" b="0" dirty="0"/>
+              <a:t>?</a:t>
+            </a:r>
+          </a:p>
+          <a:p>
+            <a:pPr>
+              <a:buFontTx/>
+              <a:buChar char="-"/>
+            </a:pPr>
+            <a:r>
+              <a:rPr lang="en-US" sz="1600" b="0" dirty="0" smtClean="0"/>
+              <a:t>Notice to </a:t>
+            </a:r>
+            <a:r>
+              <a:rPr lang="en-US" sz="1600" b="0" dirty="0" err="1" smtClean="0"/>
+              <a:t>offboarding</a:t>
+            </a:r>
+            <a:r>
+              <a:rPr lang="en-US" sz="1600" b="0" dirty="0" smtClean="0"/>
+              <a:t> employees?</a:t>
+            </a:r>
+          </a:p>
+          <a:p>
+            <a:pPr lvl="1">
+              <a:buFontTx/>
+              <a:buChar char="-"/>
+            </a:pPr>
+            <a:r>
+              <a:rPr lang="en-US" sz="1400" dirty="0" smtClean="0"/>
+              <a:t>Execs: not </a:t>
+            </a:r>
+            <a:r>
+              <a:rPr lang="en-US" sz="1400" dirty="0" err="1" smtClean="0"/>
+              <a:t>gonna</a:t>
+            </a:r>
+            <a:r>
+              <a:rPr lang="en-US" sz="1400" dirty="0" smtClean="0"/>
+              <a:t> happen</a:t>
+            </a:r>
+            <a:endParaRPr lang="en-US" sz="1400" b="0" dirty="0" smtClean="0"/>
+          </a:p>
+          <a:p>
+            <a:pPr>
+              <a:buFontTx/>
+              <a:buChar char="-"/>
+            </a:pPr>
+            <a:r>
+              <a:rPr lang="en-US" sz="1600" b="0" dirty="0" smtClean="0"/>
+              <a:t>Severance at date of termination</a:t>
+            </a:r>
+          </a:p>
+          <a:p>
+            <a:pPr lvl="1">
+              <a:buFontTx/>
+              <a:buChar char="-"/>
+            </a:pPr>
+            <a:r>
+              <a:rPr lang="en-US" sz="1400" dirty="0" smtClean="0"/>
+              <a:t>Non-egregious act / no malice</a:t>
+            </a:r>
+          </a:p>
+          <a:p>
+            <a:pPr>
+              <a:buFontTx/>
+              <a:buChar char="-"/>
+            </a:pPr>
+            <a:r>
+              <a:rPr lang="en-US" sz="1600" b="0" dirty="0" smtClean="0"/>
+              <a:t>Employee needed data from </a:t>
+            </a:r>
+            <a:r>
+              <a:rPr lang="en-US" sz="1600" b="0" dirty="0" err="1" smtClean="0"/>
+              <a:t>iSolved</a:t>
+            </a:r>
+            <a:r>
+              <a:rPr lang="en-US" sz="1600" b="0" dirty="0" smtClean="0"/>
+              <a:t> for unemployment but no longer had access</a:t>
+            </a:r>
+          </a:p>
+          <a:p>
+            <a:pPr lvl="1">
+              <a:buFontTx/>
+              <a:buChar char="-"/>
+            </a:pPr>
+            <a:r>
+              <a:rPr lang="en-US" sz="1400" dirty="0" smtClean="0"/>
+              <a:t>Provide required documents (W-2) automatically on termination</a:t>
+            </a:r>
+          </a:p>
+          <a:p>
+            <a:pPr lvl="1">
+              <a:buFontTx/>
+              <a:buChar char="-"/>
+            </a:pPr>
+            <a:r>
+              <a:rPr lang="en-US" sz="1400" b="0" dirty="0" smtClean="0"/>
+              <a:t>Archive, not delete?</a:t>
+            </a:r>
+          </a:p>
+          <a:p>
+            <a:pPr>
+              <a:buFontTx/>
+              <a:buChar char="-"/>
+            </a:pPr>
+            <a:r>
+              <a:rPr lang="en-US" sz="1600" b="0" dirty="0" smtClean="0"/>
+              <a:t>Should managers fill out State forms re firings, </a:t>
+            </a:r>
+            <a:r>
+              <a:rPr lang="en-US" sz="1600" b="0" dirty="0" err="1" smtClean="0"/>
+              <a:t>etc</a:t>
+            </a:r>
+            <a:r>
+              <a:rPr lang="en-US" sz="1600" b="0" dirty="0" smtClean="0"/>
+              <a:t>? </a:t>
+            </a:r>
+            <a:r>
+              <a:rPr lang="en-US" sz="1600" b="0" dirty="0" smtClean="0">
+                <a:sym typeface="Wingdings" panose="05000000000000000000" pitchFamily="2" charset="2"/>
+              </a:rPr>
+              <a:t> should be HR function</a:t>
+            </a:r>
+          </a:p>
+          <a:p>
+            <a:pPr>
+              <a:buFontTx/>
+              <a:buChar char="-"/>
+            </a:pPr>
+            <a:r>
+              <a:rPr lang="en-US" sz="1600" b="0" dirty="0" smtClean="0">
+                <a:sym typeface="Wingdings" panose="05000000000000000000" pitchFamily="2" charset="2"/>
+              </a:rPr>
+              <a:t>Employee &lt; 3 rating should require a formal performance improvement plan in place with milestones</a:t>
             </a:r>
           </a:p>
         </p:txBody>
@@ -6121,7 +7544,7 @@
     </p:spTree>
     <p:extLst>
       <p:ext uri="{BB962C8B-B14F-4D97-AF65-F5344CB8AC3E}">
-        <p14:creationId xmlns:p14="http://schemas.microsoft.com/office/powerpoint/2010/main" val="617521990"/>
+        <p14:creationId xmlns:p14="http://schemas.microsoft.com/office/powerpoint/2010/main" val="258962402"/>
       </p:ext>
     </p:extLst>
   </p:cSld>
@@ -6373,14 +7796,14 @@
         <a:effectLst/>
         <a:extLst>
           <a:ext uri="{909E8E84-426E-40dd-AFC4-6F175D3DCCD1}">
-            <a14:hiddenFill xmlns="" xmlns:a14="http://schemas.microsoft.com/office/drawing/2010/main">
+            <a14:hiddenFill xmlns:a14="http://schemas.microsoft.com/office/drawing/2010/main" xmlns="">
               <a:solidFill>
                 <a:schemeClr val="accent1"/>
               </a:solidFill>
             </a14:hiddenFill>
           </a:ext>
           <a:ext uri="{91240B29-F687-4f45-9708-019B960494DF}">
-            <a14:hiddenLine xmlns="" xmlns:a14="http://schemas.microsoft.com/office/drawing/2010/main" w="9525" cap="flat" cmpd="sng" algn="ctr">
+            <a14:hiddenLine xmlns:a14="http://schemas.microsoft.com/office/drawing/2010/main" xmlns="" w="9525" cap="flat" cmpd="sng" algn="ctr">
               <a:solidFill>
                 <a:schemeClr val="tx1"/>
               </a:solidFill>
@@ -6391,7 +7814,7 @@
             </a14:hiddenLine>
           </a:ext>
           <a:ext uri="{AF507438-7753-43e0-B8FC-AC1667EBCBE1}">
-            <a14:hiddenEffects xmlns="" xmlns:a14="http://schemas.microsoft.com/office/drawing/2010/main">
+            <a14:hiddenEffects xmlns:a14="http://schemas.microsoft.com/office/drawing/2010/main" xmlns="">
               <a:effectLst>
                 <a:outerShdw dist="35921" dir="2700000" algn="ctr" rotWithShape="0">
                   <a:schemeClr val="bg2"/>
@@ -6457,14 +7880,14 @@
         <a:effectLst/>
         <a:extLst>
           <a:ext uri="{909E8E84-426E-40dd-AFC4-6F175D3DCCD1}">
-            <a14:hiddenFill xmlns="" xmlns:a14="http://schemas.microsoft.com/office/drawing/2010/main">
+            <a14:hiddenFill xmlns:a14="http://schemas.microsoft.com/office/drawing/2010/main" xmlns="">
               <a:solidFill>
                 <a:schemeClr val="accent1"/>
               </a:solidFill>
             </a14:hiddenFill>
           </a:ext>
           <a:ext uri="{91240B29-F687-4f45-9708-019B960494DF}">
-            <a14:hiddenLine xmlns="" xmlns:a14="http://schemas.microsoft.com/office/drawing/2010/main" w="9525" cap="flat" cmpd="sng" algn="ctr">
+            <a14:hiddenLine xmlns:a14="http://schemas.microsoft.com/office/drawing/2010/main" xmlns="" w="9525" cap="flat" cmpd="sng" algn="ctr">
               <a:solidFill>
                 <a:schemeClr val="tx1"/>
               </a:solidFill>
@@ -6475,7 +7898,7 @@
             </a14:hiddenLine>
           </a:ext>
           <a:ext uri="{AF507438-7753-43e0-B8FC-AC1667EBCBE1}">
-            <a14:hiddenEffects xmlns="" xmlns:a14="http://schemas.microsoft.com/office/drawing/2010/main">
+            <a14:hiddenEffects xmlns:a14="http://schemas.microsoft.com/office/drawing/2010/main" xmlns="">
               <a:effectLst>
                 <a:outerShdw dist="35921" dir="2700000" algn="ctr" rotWithShape="0">
                   <a:schemeClr val="bg2"/>
@@ -6529,14 +7952,14 @@
         <a:effectLst/>
         <a:extLst>
           <a:ext uri="{909E8E84-426E-40dd-AFC4-6F175D3DCCD1}">
-            <a14:hiddenFill xmlns="" xmlns:a14="http://schemas.microsoft.com/office/drawing/2010/main">
+            <a14:hiddenFill xmlns:a14="http://schemas.microsoft.com/office/drawing/2010/main" xmlns="">
               <a:solidFill>
                 <a:schemeClr val="accent1"/>
               </a:solidFill>
             </a14:hiddenFill>
           </a:ext>
           <a:ext uri="{91240B29-F687-4f45-9708-019B960494DF}">
-            <a14:hiddenLine xmlns="" xmlns:a14="http://schemas.microsoft.com/office/drawing/2010/main" w="9525">
+            <a14:hiddenLine xmlns:a14="http://schemas.microsoft.com/office/drawing/2010/main" xmlns="" w="9525">
               <a:solidFill>
                 <a:schemeClr val="tx1"/>
               </a:solidFill>
@@ -6546,7 +7969,7 @@
             </a14:hiddenLine>
           </a:ext>
           <a:ext uri="{AF507438-7753-43e0-B8FC-AC1667EBCBE1}">
-            <a14:hiddenEffects xmlns="" xmlns:a14="http://schemas.microsoft.com/office/drawing/2010/main">
+            <a14:hiddenEffects xmlns:a14="http://schemas.microsoft.com/office/drawing/2010/main" xmlns="">
               <a:effectLst>
                 <a:outerShdw dist="35921" dir="2700000" algn="ctr" rotWithShape="0">
                   <a:schemeClr val="bg2"/>
@@ -7645,12 +9068,9 @@
 </file>
 
 <file path=customXml/item1.xml><?xml version="1.0" encoding="utf-8"?>
-<?mso-contentType ?>
-<FormTemplates xmlns="http://schemas.microsoft.com/sharepoint/v3/contenttype/forms">
-  <Display>DocumentLibraryForm</Display>
-  <Edit>DocumentLibraryForm</Edit>
-  <New>DocumentLibraryForm</New>
-</FormTemplates>
+<p:properties xmlns:p="http://schemas.microsoft.com/office/2006/metadata/properties" xmlns:xsi="http://www.w3.org/2001/XMLSchema-instance" xmlns:pc="http://schemas.microsoft.com/office/infopath/2007/PartnerControls">
+  <documentManagement/>
+</p:properties>
 </file>
 
 <file path=customXml/item2.xml><?xml version="1.0" encoding="utf-8"?>
@@ -7768,15 +9188,25 @@
 </file>
 
 <file path=customXml/item3.xml><?xml version="1.0" encoding="utf-8"?>
-<p:properties xmlns:p="http://schemas.microsoft.com/office/2006/metadata/properties" xmlns:xsi="http://www.w3.org/2001/XMLSchema-instance" xmlns:pc="http://schemas.microsoft.com/office/infopath/2007/PartnerControls">
-  <documentManagement/>
-</p:properties>
+<?mso-contentType ?>
+<FormTemplates xmlns="http://schemas.microsoft.com/sharepoint/v3/contenttype/forms">
+  <Display>DocumentLibraryForm</Display>
+  <Edit>DocumentLibraryForm</Edit>
+  <New>DocumentLibraryForm</New>
+</FormTemplates>
 </file>
 
 <file path=customXml/itemProps1.xml><?xml version="1.0" encoding="utf-8"?>
-<ds:datastoreItem xmlns:ds="http://schemas.openxmlformats.org/officeDocument/2006/customXml" ds:itemID="{DFB7BE5F-26F2-4362-A3B5-155F373B599C}">
+<ds:datastoreItem xmlns:ds="http://schemas.openxmlformats.org/officeDocument/2006/customXml" ds:itemID="{1E389399-0599-4673-9A42-10EC0A4F664A}">
   <ds:schemaRefs>
-    <ds:schemaRef ds:uri="http://schemas.microsoft.com/sharepoint/v3/contenttype/forms"/>
+    <ds:schemaRef ds:uri="http://schemas.microsoft.com/office/2006/documentManagement/types"/>
+    <ds:schemaRef ds:uri="http://schemas.microsoft.com/office/infopath/2007/PartnerControls"/>
+    <ds:schemaRef ds:uri="http://purl.org/dc/elements/1.1/"/>
+    <ds:schemaRef ds:uri="http://schemas.microsoft.com/office/2006/metadata/properties"/>
+    <ds:schemaRef ds:uri="http://purl.org/dc/terms/"/>
+    <ds:schemaRef ds:uri="http://schemas.openxmlformats.org/package/2006/metadata/core-properties"/>
+    <ds:schemaRef ds:uri="http://www.w3.org/XML/1998/namespace"/>
+    <ds:schemaRef ds:uri="http://purl.org/dc/dcmitype/"/>
   </ds:schemaRefs>
 </ds:datastoreItem>
 </file>
@@ -7798,16 +9228,9 @@
 </file>
 
 <file path=customXml/itemProps3.xml><?xml version="1.0" encoding="utf-8"?>
-<ds:datastoreItem xmlns:ds="http://schemas.openxmlformats.org/officeDocument/2006/customXml" ds:itemID="{1E389399-0599-4673-9A42-10EC0A4F664A}">
+<ds:datastoreItem xmlns:ds="http://schemas.openxmlformats.org/officeDocument/2006/customXml" ds:itemID="{DFB7BE5F-26F2-4362-A3B5-155F373B599C}">
   <ds:schemaRefs>
-    <ds:schemaRef ds:uri="http://schemas.microsoft.com/office/2006/documentManagement/types"/>
-    <ds:schemaRef ds:uri="http://schemas.microsoft.com/office/infopath/2007/PartnerControls"/>
-    <ds:schemaRef ds:uri="http://purl.org/dc/elements/1.1/"/>
-    <ds:schemaRef ds:uri="http://schemas.microsoft.com/office/2006/metadata/properties"/>
-    <ds:schemaRef ds:uri="http://purl.org/dc/terms/"/>
-    <ds:schemaRef ds:uri="http://schemas.openxmlformats.org/package/2006/metadata/core-properties"/>
-    <ds:schemaRef ds:uri="http://www.w3.org/XML/1998/namespace"/>
-    <ds:schemaRef ds:uri="http://purl.org/dc/dcmitype/"/>
+    <ds:schemaRef ds:uri="http://schemas.microsoft.com/sharepoint/v3/contenttype/forms"/>
   </ds:schemaRefs>
 </ds:datastoreItem>
 </file>
</xml_diff>